<commit_message>
New Presentation Slides - Full Version
</commit_message>
<xml_diff>
--- a/Presentation/CS615 Group Presentation.pptx
+++ b/Presentation/CS615 Group Presentation.pptx
@@ -5203,7 +5203,22 @@
             <a:pPr lvl="1" algn="just"/>
             <a:r>
               <a:rPr lang="en-US" dirty="0" smtClean="0"/>
-              <a:t>Doesn’t require zooming to make the text readable</a:t>
+              <a:t>Doesn’t require zooming to make the text </a:t>
+            </a:r>
+            <a:r>
+              <a:rPr lang="en-US" dirty="0" smtClean="0"/>
+              <a:t>readable</a:t>
+            </a:r>
+          </a:p>
+          <a:p>
+            <a:pPr lvl="1" algn="just"/>
+            <a:r>
+              <a:rPr lang="en-US" dirty="0" smtClean="0"/>
+              <a:t>Works </a:t>
+            </a:r>
+            <a:r>
+              <a:rPr lang="en-US" smtClean="0"/>
+              <a:t>on mobiles and tabs</a:t>
             </a:r>
             <a:endParaRPr lang="en-US" dirty="0"/>
           </a:p>
@@ -5385,7 +5400,6 @@
               <a:rPr lang="en-US" dirty="0" smtClean="0"/>
               <a:t>Delivery</a:t>
             </a:r>
-            <a:endParaRPr lang="en-US" dirty="0" smtClean="0"/>
           </a:p>
           <a:p>
             <a:pPr lvl="1" algn="just"/>
@@ -9039,7 +9053,7 @@
                   <a14:useLocalDpi xmlns:a14="http://schemas.microsoft.com/office/drawing/2010/main" val="0"/>
                 </a:ext>
                 <a:ext uri="{96DAC541-7B7A-43D3-8B79-37D633B846F1}">
-                  <asvg:svgBlip xmlns="" xmlns:asvg="http://schemas.microsoft.com/office/drawing/2016/SVG/main" r:embed="rId3"/>
+                  <asvg:svgBlip xmlns:asvg="http://schemas.microsoft.com/office/drawing/2016/SVG/main" xmlns="" r:embed="rId3"/>
                 </a:ext>
               </a:extLst>
             </a:blip>
@@ -12400,7 +12414,7 @@
                   <a14:useLocalDpi xmlns:a14="http://schemas.microsoft.com/office/drawing/2010/main" val="0"/>
                 </a:ext>
                 <a:ext uri="{96DAC541-7B7A-43D3-8B79-37D633B846F1}">
-                  <asvg:svgBlip xmlns="" xmlns:asvg="http://schemas.microsoft.com/office/drawing/2016/SVG/main" r:embed="rId3"/>
+                  <asvg:svgBlip xmlns:asvg="http://schemas.microsoft.com/office/drawing/2016/SVG/main" xmlns="" r:embed="rId3"/>
                 </a:ext>
               </a:extLst>
             </a:blip>

</xml_diff>

<commit_message>
Documentation & Presentation - LATEST
</commit_message>
<xml_diff>
--- a/Presentation/CS615 Group Presentation.pptx
+++ b/Presentation/CS615 Group Presentation.pptx
@@ -5,27 +5,29 @@
     <p:sldMasterId id="2147483765" r:id="rId1"/>
   </p:sldMasterIdLst>
   <p:notesMasterIdLst>
-    <p:notesMasterId r:id="rId20"/>
+    <p:notesMasterId r:id="rId22"/>
   </p:notesMasterIdLst>
   <p:sldIdLst>
     <p:sldId id="257" r:id="rId2"/>
     <p:sldId id="263" r:id="rId3"/>
-    <p:sldId id="350" r:id="rId4"/>
-    <p:sldId id="351" r:id="rId5"/>
-    <p:sldId id="352" r:id="rId6"/>
-    <p:sldId id="353" r:id="rId7"/>
-    <p:sldId id="344" r:id="rId8"/>
-    <p:sldId id="323" r:id="rId9"/>
-    <p:sldId id="343" r:id="rId10"/>
-    <p:sldId id="346" r:id="rId11"/>
-    <p:sldId id="348" r:id="rId12"/>
-    <p:sldId id="349" r:id="rId13"/>
-    <p:sldId id="358" r:id="rId14"/>
-    <p:sldId id="354" r:id="rId15"/>
-    <p:sldId id="355" r:id="rId16"/>
-    <p:sldId id="356" r:id="rId17"/>
-    <p:sldId id="357" r:id="rId18"/>
-    <p:sldId id="305" r:id="rId19"/>
+    <p:sldId id="359" r:id="rId4"/>
+    <p:sldId id="360" r:id="rId5"/>
+    <p:sldId id="361" r:id="rId6"/>
+    <p:sldId id="362" r:id="rId7"/>
+    <p:sldId id="363" r:id="rId8"/>
+    <p:sldId id="344" r:id="rId9"/>
+    <p:sldId id="323" r:id="rId10"/>
+    <p:sldId id="343" r:id="rId11"/>
+    <p:sldId id="346" r:id="rId12"/>
+    <p:sldId id="364" r:id="rId13"/>
+    <p:sldId id="348" r:id="rId14"/>
+    <p:sldId id="349" r:id="rId15"/>
+    <p:sldId id="358" r:id="rId16"/>
+    <p:sldId id="354" r:id="rId17"/>
+    <p:sldId id="355" r:id="rId18"/>
+    <p:sldId id="356" r:id="rId19"/>
+    <p:sldId id="357" r:id="rId20"/>
+    <p:sldId id="305" r:id="rId21"/>
   </p:sldIdLst>
   <p:sldSz cx="12192000" cy="6858000"/>
   <p:notesSz cx="6858000" cy="9144000"/>
@@ -214,7 +216,7 @@
           <a:p>
             <a:fld id="{E3AD8F3F-748B-4221-89B1-755B747CF06F}" type="datetimeFigureOut">
               <a:rPr lang="en-US" smtClean="0"/>
-              <a:t>5/5/2020</a:t>
+              <a:t>5/6/2020</a:t>
             </a:fld>
             <a:endParaRPr lang="en-US"/>
           </a:p>
@@ -716,7 +718,7 @@
           <a:p>
             <a:fld id="{8C4C986C-7B1C-401A-9773-421C3A2F58A4}" type="slidenum">
               <a:rPr lang="en-US" smtClean="0"/>
-              <a:t>10</a:t>
+              <a:t>5</a:t>
             </a:fld>
             <a:endParaRPr lang="en-US"/>
           </a:p>
@@ -725,7 +727,7 @@
     </p:spTree>
     <p:extLst>
       <p:ext uri="{BB962C8B-B14F-4D97-AF65-F5344CB8AC3E}">
-        <p14:creationId xmlns:p14="http://schemas.microsoft.com/office/powerpoint/2010/main" val="1797351371"/>
+        <p14:creationId xmlns:p14="http://schemas.microsoft.com/office/powerpoint/2010/main" val="3506122932"/>
       </p:ext>
     </p:extLst>
   </p:cSld>
@@ -810,7 +812,7 @@
     </p:spTree>
     <p:extLst>
       <p:ext uri="{BB962C8B-B14F-4D97-AF65-F5344CB8AC3E}">
-        <p14:creationId xmlns:p14="http://schemas.microsoft.com/office/powerpoint/2010/main" val="2596143400"/>
+        <p14:creationId xmlns:p14="http://schemas.microsoft.com/office/powerpoint/2010/main" val="1797351371"/>
       </p:ext>
     </p:extLst>
   </p:cSld>
@@ -895,7 +897,7 @@
     </p:spTree>
     <p:extLst>
       <p:ext uri="{BB962C8B-B14F-4D97-AF65-F5344CB8AC3E}">
-        <p14:creationId xmlns:p14="http://schemas.microsoft.com/office/powerpoint/2010/main" val="788072008"/>
+        <p14:creationId xmlns:p14="http://schemas.microsoft.com/office/powerpoint/2010/main" val="3766742524"/>
       </p:ext>
     </p:extLst>
   </p:cSld>
@@ -972,6 +974,176 @@
             <a:fld id="{8C4C986C-7B1C-401A-9773-421C3A2F58A4}" type="slidenum">
               <a:rPr lang="en-US" smtClean="0"/>
               <a:t>13</a:t>
+            </a:fld>
+            <a:endParaRPr lang="en-US"/>
+          </a:p>
+        </p:txBody>
+      </p:sp>
+    </p:spTree>
+    <p:extLst>
+      <p:ext uri="{BB962C8B-B14F-4D97-AF65-F5344CB8AC3E}">
+        <p14:creationId xmlns:p14="http://schemas.microsoft.com/office/powerpoint/2010/main" val="2596143400"/>
+      </p:ext>
+    </p:extLst>
+  </p:cSld>
+  <p:clrMapOvr>
+    <a:masterClrMapping/>
+  </p:clrMapOvr>
+</p:notes>
+</file>
+
+<file path=ppt/notesSlides/notesSlide7.xml><?xml version="1.0" encoding="utf-8"?>
+<p:notes xmlns:a="http://schemas.openxmlformats.org/drawingml/2006/main" xmlns:r="http://schemas.openxmlformats.org/officeDocument/2006/relationships" xmlns:p="http://schemas.openxmlformats.org/presentationml/2006/main">
+  <p:cSld>
+    <p:spTree>
+      <p:nvGrpSpPr>
+        <p:cNvPr id="1" name=""/>
+        <p:cNvGrpSpPr/>
+        <p:nvPr/>
+      </p:nvGrpSpPr>
+      <p:grpSpPr>
+        <a:xfrm>
+          <a:off x="0" y="0"/>
+          <a:ext cx="0" cy="0"/>
+          <a:chOff x="0" y="0"/>
+          <a:chExt cx="0" cy="0"/>
+        </a:xfrm>
+      </p:grpSpPr>
+      <p:sp>
+        <p:nvSpPr>
+          <p:cNvPr id="2" name="Slide Image Placeholder 1"/>
+          <p:cNvSpPr>
+            <a:spLocks noGrp="1" noRot="1" noChangeAspect="1"/>
+          </p:cNvSpPr>
+          <p:nvPr>
+            <p:ph type="sldImg"/>
+          </p:nvPr>
+        </p:nvSpPr>
+        <p:spPr/>
+      </p:sp>
+      <p:sp>
+        <p:nvSpPr>
+          <p:cNvPr id="3" name="Notes Placeholder 2"/>
+          <p:cNvSpPr>
+            <a:spLocks noGrp="1"/>
+          </p:cNvSpPr>
+          <p:nvPr>
+            <p:ph type="body" idx="1"/>
+          </p:nvPr>
+        </p:nvSpPr>
+        <p:spPr/>
+        <p:txBody>
+          <a:bodyPr/>
+          <a:lstStyle/>
+          <a:p>
+            <a:pPr algn="just"/>
+            <a:endParaRPr lang="en-US" dirty="0"/>
+          </a:p>
+        </p:txBody>
+      </p:sp>
+      <p:sp>
+        <p:nvSpPr>
+          <p:cNvPr id="4" name="Slide Number Placeholder 3"/>
+          <p:cNvSpPr>
+            <a:spLocks noGrp="1"/>
+          </p:cNvSpPr>
+          <p:nvPr>
+            <p:ph type="sldNum" sz="quarter" idx="10"/>
+          </p:nvPr>
+        </p:nvSpPr>
+        <p:spPr/>
+        <p:txBody>
+          <a:bodyPr/>
+          <a:lstStyle/>
+          <a:p>
+            <a:fld id="{8C4C986C-7B1C-401A-9773-421C3A2F58A4}" type="slidenum">
+              <a:rPr lang="en-US" smtClean="0"/>
+              <a:t>14</a:t>
+            </a:fld>
+            <a:endParaRPr lang="en-US"/>
+          </a:p>
+        </p:txBody>
+      </p:sp>
+    </p:spTree>
+    <p:extLst>
+      <p:ext uri="{BB962C8B-B14F-4D97-AF65-F5344CB8AC3E}">
+        <p14:creationId xmlns:p14="http://schemas.microsoft.com/office/powerpoint/2010/main" val="788072008"/>
+      </p:ext>
+    </p:extLst>
+  </p:cSld>
+  <p:clrMapOvr>
+    <a:masterClrMapping/>
+  </p:clrMapOvr>
+</p:notes>
+</file>
+
+<file path=ppt/notesSlides/notesSlide8.xml><?xml version="1.0" encoding="utf-8"?>
+<p:notes xmlns:a="http://schemas.openxmlformats.org/drawingml/2006/main" xmlns:r="http://schemas.openxmlformats.org/officeDocument/2006/relationships" xmlns:p="http://schemas.openxmlformats.org/presentationml/2006/main">
+  <p:cSld>
+    <p:spTree>
+      <p:nvGrpSpPr>
+        <p:cNvPr id="1" name=""/>
+        <p:cNvGrpSpPr/>
+        <p:nvPr/>
+      </p:nvGrpSpPr>
+      <p:grpSpPr>
+        <a:xfrm>
+          <a:off x="0" y="0"/>
+          <a:ext cx="0" cy="0"/>
+          <a:chOff x="0" y="0"/>
+          <a:chExt cx="0" cy="0"/>
+        </a:xfrm>
+      </p:grpSpPr>
+      <p:sp>
+        <p:nvSpPr>
+          <p:cNvPr id="2" name="Slide Image Placeholder 1"/>
+          <p:cNvSpPr>
+            <a:spLocks noGrp="1" noRot="1" noChangeAspect="1"/>
+          </p:cNvSpPr>
+          <p:nvPr>
+            <p:ph type="sldImg"/>
+          </p:nvPr>
+        </p:nvSpPr>
+        <p:spPr/>
+      </p:sp>
+      <p:sp>
+        <p:nvSpPr>
+          <p:cNvPr id="3" name="Notes Placeholder 2"/>
+          <p:cNvSpPr>
+            <a:spLocks noGrp="1"/>
+          </p:cNvSpPr>
+          <p:nvPr>
+            <p:ph type="body" idx="1"/>
+          </p:nvPr>
+        </p:nvSpPr>
+        <p:spPr/>
+        <p:txBody>
+          <a:bodyPr/>
+          <a:lstStyle/>
+          <a:p>
+            <a:pPr algn="just"/>
+            <a:endParaRPr lang="en-US" dirty="0"/>
+          </a:p>
+        </p:txBody>
+      </p:sp>
+      <p:sp>
+        <p:nvSpPr>
+          <p:cNvPr id="4" name="Slide Number Placeholder 3"/>
+          <p:cNvSpPr>
+            <a:spLocks noGrp="1"/>
+          </p:cNvSpPr>
+          <p:nvPr>
+            <p:ph type="sldNum" sz="quarter" idx="10"/>
+          </p:nvPr>
+        </p:nvSpPr>
+        <p:spPr/>
+        <p:txBody>
+          <a:bodyPr/>
+          <a:lstStyle/>
+          <a:p>
+            <a:fld id="{8C4C986C-7B1C-401A-9773-421C3A2F58A4}" type="slidenum">
+              <a:rPr lang="en-US" smtClean="0"/>
+              <a:t>15</a:t>
             </a:fld>
             <a:endParaRPr lang="en-US"/>
           </a:p>
@@ -1216,7 +1388,7 @@
           <a:p>
             <a:fld id="{16047D19-6317-496A-A22E-F4F876F4BF42}" type="datetimeFigureOut">
               <a:rPr lang="en-US" smtClean="0"/>
-              <a:t>5/5/2020</a:t>
+              <a:t>5/6/2020</a:t>
             </a:fld>
             <a:endParaRPr lang="en-US"/>
           </a:p>
@@ -1424,7 +1596,7 @@
           <a:p>
             <a:fld id="{16047D19-6317-496A-A22E-F4F876F4BF42}" type="datetimeFigureOut">
               <a:rPr lang="en-US" smtClean="0"/>
-              <a:t>5/5/2020</a:t>
+              <a:t>5/6/2020</a:t>
             </a:fld>
             <a:endParaRPr lang="en-US"/>
           </a:p>
@@ -1680,7 +1852,7 @@
           <a:p>
             <a:fld id="{16047D19-6317-496A-A22E-F4F876F4BF42}" type="datetimeFigureOut">
               <a:rPr lang="en-US" smtClean="0"/>
-              <a:t>5/5/2020</a:t>
+              <a:t>5/6/2020</a:t>
             </a:fld>
             <a:endParaRPr lang="en-US"/>
           </a:p>
@@ -1854,7 +2026,7 @@
           <a:p>
             <a:fld id="{16047D19-6317-496A-A22E-F4F876F4BF42}" type="datetimeFigureOut">
               <a:rPr lang="en-US" smtClean="0"/>
-              <a:t>5/5/2020</a:t>
+              <a:t>5/6/2020</a:t>
             </a:fld>
             <a:endParaRPr lang="en-US"/>
           </a:p>
@@ -2197,7 +2369,7 @@
           <a:p>
             <a:fld id="{16047D19-6317-496A-A22E-F4F876F4BF42}" type="datetimeFigureOut">
               <a:rPr lang="en-US" smtClean="0"/>
-              <a:t>5/5/2020</a:t>
+              <a:t>5/6/2020</a:t>
             </a:fld>
             <a:endParaRPr lang="en-US"/>
           </a:p>
@@ -2472,7 +2644,7 @@
           <a:p>
             <a:fld id="{16047D19-6317-496A-A22E-F4F876F4BF42}" type="datetimeFigureOut">
               <a:rPr lang="en-US" smtClean="0"/>
-              <a:t>5/5/2020</a:t>
+              <a:t>5/6/2020</a:t>
             </a:fld>
             <a:endParaRPr lang="en-US"/>
           </a:p>
@@ -2851,7 +3023,7 @@
           <a:p>
             <a:fld id="{16047D19-6317-496A-A22E-F4F876F4BF42}" type="datetimeFigureOut">
               <a:rPr lang="en-US" smtClean="0"/>
-              <a:t>5/5/2020</a:t>
+              <a:t>5/6/2020</a:t>
             </a:fld>
             <a:endParaRPr lang="en-US"/>
           </a:p>
@@ -2969,7 +3141,7 @@
           <a:p>
             <a:fld id="{16047D19-6317-496A-A22E-F4F876F4BF42}" type="datetimeFigureOut">
               <a:rPr lang="en-US" smtClean="0"/>
-              <a:t>5/5/2020</a:t>
+              <a:t>5/6/2020</a:t>
             </a:fld>
             <a:endParaRPr lang="en-US"/>
           </a:p>
@@ -3140,7 +3312,7 @@
           <a:p>
             <a:fld id="{16047D19-6317-496A-A22E-F4F876F4BF42}" type="datetimeFigureOut">
               <a:rPr lang="en-US" smtClean="0"/>
-              <a:t>5/5/2020</a:t>
+              <a:t>5/6/2020</a:t>
             </a:fld>
             <a:endParaRPr lang="en-US"/>
           </a:p>
@@ -3494,7 +3666,7 @@
           <a:p>
             <a:fld id="{16047D19-6317-496A-A22E-F4F876F4BF42}" type="datetimeFigureOut">
               <a:rPr lang="en-US" smtClean="0"/>
-              <a:t>5/5/2020</a:t>
+              <a:t>5/6/2020</a:t>
             </a:fld>
             <a:endParaRPr lang="en-US"/>
           </a:p>
@@ -3876,7 +4048,7 @@
           <a:p>
             <a:fld id="{16047D19-6317-496A-A22E-F4F876F4BF42}" type="datetimeFigureOut">
               <a:rPr lang="en-US" smtClean="0"/>
-              <a:t>5/5/2020</a:t>
+              <a:t>5/6/2020</a:t>
             </a:fld>
             <a:endParaRPr lang="en-US"/>
           </a:p>
@@ -4163,7 +4335,7 @@
           <a:p>
             <a:fld id="{16047D19-6317-496A-A22E-F4F876F4BF42}" type="datetimeFigureOut">
               <a:rPr lang="en-US" smtClean="0"/>
-              <a:t>5/5/2020</a:t>
+              <a:t>5/6/2020</a:t>
             </a:fld>
             <a:endParaRPr lang="en-US"/>
           </a:p>
@@ -4933,7 +5105,268 @@
         </p:nvSpPr>
         <p:spPr>
           <a:xfrm>
-            <a:off x="387626" y="253926"/>
+            <a:off x="277559" y="1205211"/>
+            <a:ext cx="3061252" cy="499019"/>
+          </a:xfrm>
+        </p:spPr>
+        <p:txBody>
+          <a:bodyPr>
+            <a:normAutofit/>
+          </a:bodyPr>
+          <a:lstStyle/>
+          <a:p>
+            <a:r>
+              <a:rPr lang="en-US" sz="2400" b="1" dirty="0" smtClean="0">
+                <a:latin typeface="+mn-lt"/>
+              </a:rPr>
+              <a:t>Web App Architecture</a:t>
+            </a:r>
+            <a:endParaRPr lang="en-US" sz="2400" b="1" dirty="0">
+              <a:latin typeface="+mn-lt"/>
+            </a:endParaRPr>
+          </a:p>
+        </p:txBody>
+      </p:sp>
+      <p:pic>
+        <p:nvPicPr>
+          <p:cNvPr id="3" name="Picture 2"/>
+          <p:cNvPicPr>
+            <a:picLocks noChangeAspect="1"/>
+          </p:cNvPicPr>
+          <p:nvPr/>
+        </p:nvPicPr>
+        <p:blipFill>
+          <a:blip r:embed="rId2">
+            <a:extLst>
+              <a:ext uri="{28A0092B-C50C-407E-A947-70E740481C1C}">
+                <a14:useLocalDpi xmlns:a14="http://schemas.microsoft.com/office/drawing/2010/main" val="0"/>
+              </a:ext>
+            </a:extLst>
+          </a:blip>
+          <a:stretch>
+            <a:fillRect/>
+          </a:stretch>
+        </p:blipFill>
+        <p:spPr>
+          <a:xfrm>
+            <a:off x="2810933" y="1794933"/>
+            <a:ext cx="9381067" cy="4453855"/>
+          </a:xfrm>
+          <a:prstGeom prst="rect">
+            <a:avLst/>
+          </a:prstGeom>
+        </p:spPr>
+      </p:pic>
+      <p:sp>
+        <p:nvSpPr>
+          <p:cNvPr id="6" name="Content Placeholder 2"/>
+          <p:cNvSpPr>
+            <a:spLocks noGrp="1"/>
+          </p:cNvSpPr>
+          <p:nvPr>
+            <p:ph idx="1"/>
+          </p:nvPr>
+        </p:nvSpPr>
+        <p:spPr>
+          <a:xfrm>
+            <a:off x="0" y="1902444"/>
+            <a:ext cx="2739224" cy="4346344"/>
+          </a:xfrm>
+        </p:spPr>
+        <p:txBody>
+          <a:bodyPr>
+            <a:normAutofit fontScale="85000" lnSpcReduction="20000"/>
+          </a:bodyPr>
+          <a:lstStyle/>
+          <a:p>
+            <a:pPr lvl="1"/>
+            <a:r>
+              <a:rPr lang="en-US" dirty="0" smtClean="0"/>
+              <a:t>Used MVC </a:t>
+            </a:r>
+          </a:p>
+          <a:p>
+            <a:pPr lvl="2"/>
+            <a:r>
+              <a:rPr lang="en-US" dirty="0"/>
+              <a:t>T</a:t>
+            </a:r>
+            <a:r>
+              <a:rPr lang="en-US" dirty="0" smtClean="0"/>
+              <a:t>o separate app into </a:t>
+            </a:r>
+            <a:r>
+              <a:rPr lang="en-US" dirty="0" smtClean="0"/>
+              <a:t>3 </a:t>
+            </a:r>
+            <a:r>
+              <a:rPr lang="en-US" dirty="0" smtClean="0"/>
+              <a:t>components:</a:t>
+            </a:r>
+          </a:p>
+          <a:p>
+            <a:pPr lvl="2"/>
+            <a:r>
+              <a:rPr lang="en-US" dirty="0" smtClean="0"/>
+              <a:t>Logic, Interface, Database</a:t>
+            </a:r>
+            <a:endParaRPr lang="en-US" dirty="0" smtClean="0"/>
+          </a:p>
+          <a:p>
+            <a:pPr lvl="1"/>
+            <a:r>
+              <a:rPr lang="en-US" dirty="0" smtClean="0"/>
+              <a:t>Model</a:t>
+            </a:r>
+          </a:p>
+          <a:p>
+            <a:pPr lvl="2"/>
+            <a:r>
+              <a:rPr lang="en-US" dirty="0" smtClean="0"/>
+              <a:t>Shows MongoDB data model of our library app</a:t>
+            </a:r>
+          </a:p>
+          <a:p>
+            <a:pPr lvl="2"/>
+            <a:r>
+              <a:rPr lang="en-US" dirty="0" smtClean="0"/>
+              <a:t>Constraints &amp; formats to store data </a:t>
+            </a:r>
+            <a:r>
+              <a:rPr lang="en-US" dirty="0" err="1" smtClean="0"/>
+              <a:t>e.g</a:t>
+            </a:r>
+            <a:r>
+              <a:rPr lang="en-US" dirty="0" smtClean="0"/>
+              <a:t> JSON format</a:t>
+            </a:r>
+          </a:p>
+          <a:p>
+            <a:pPr lvl="2"/>
+            <a:r>
+              <a:rPr lang="en-US" dirty="0" smtClean="0"/>
+              <a:t>Represents collections e.g., user, books</a:t>
+            </a:r>
+          </a:p>
+          <a:p>
+            <a:pPr lvl="2"/>
+            <a:r>
+              <a:rPr lang="en-US" dirty="0" smtClean="0"/>
+              <a:t>Stores a book when user’s request passes through controller to model</a:t>
+            </a:r>
+            <a:endParaRPr lang="en-US" dirty="0" smtClean="0"/>
+          </a:p>
+          <a:p>
+            <a:pPr lvl="1"/>
+            <a:r>
+              <a:rPr lang="en-US" dirty="0" smtClean="0"/>
+              <a:t>View</a:t>
+            </a:r>
+            <a:endParaRPr lang="en-US" dirty="0"/>
+          </a:p>
+          <a:p>
+            <a:pPr lvl="2"/>
+            <a:r>
+              <a:rPr lang="en-US" dirty="0" smtClean="0"/>
+              <a:t>Presents data to the users using .html files e.g., viewing personal or social library books</a:t>
+            </a:r>
+            <a:endParaRPr lang="en-US" dirty="0"/>
+          </a:p>
+          <a:p>
+            <a:pPr lvl="1"/>
+            <a:r>
+              <a:rPr lang="en-US" dirty="0" smtClean="0"/>
+              <a:t>Controller</a:t>
+            </a:r>
+          </a:p>
+          <a:p>
+            <a:pPr lvl="2"/>
+            <a:r>
+              <a:rPr lang="en-US" dirty="0" smtClean="0"/>
+              <a:t>Controls users’ requests</a:t>
+            </a:r>
+          </a:p>
+          <a:p>
+            <a:pPr lvl="2"/>
+            <a:r>
+              <a:rPr lang="en-US" dirty="0" smtClean="0"/>
+              <a:t>Generates appropriate response </a:t>
+            </a:r>
+          </a:p>
+          <a:p>
+            <a:pPr lvl="2"/>
+            <a:r>
+              <a:rPr lang="en-US" dirty="0" smtClean="0"/>
+              <a:t>Gets triggered when user passes any request </a:t>
+            </a:r>
+            <a:r>
+              <a:rPr lang="en-US" dirty="0" err="1" smtClean="0"/>
+              <a:t>e.g</a:t>
+            </a:r>
+            <a:r>
+              <a:rPr lang="en-US" dirty="0" smtClean="0"/>
+              <a:t> to view a book</a:t>
+            </a:r>
+            <a:endParaRPr lang="en-US" dirty="0"/>
+          </a:p>
+          <a:p>
+            <a:pPr marL="384048" lvl="2" indent="0">
+              <a:buNone/>
+            </a:pPr>
+            <a:endParaRPr lang="en-US" dirty="0" smtClean="0"/>
+          </a:p>
+        </p:txBody>
+      </p:sp>
+    </p:spTree>
+    <p:extLst>
+      <p:ext uri="{BB962C8B-B14F-4D97-AF65-F5344CB8AC3E}">
+        <p14:creationId xmlns:p14="http://schemas.microsoft.com/office/powerpoint/2010/main" val="1539725459"/>
+      </p:ext>
+    </p:extLst>
+  </p:cSld>
+  <p:clrMapOvr>
+    <a:masterClrMapping/>
+  </p:clrMapOvr>
+  <p:timing>
+    <p:tnLst>
+      <p:par>
+        <p:cTn id="1" dur="indefinite" restart="never" nodeType="tmRoot"/>
+      </p:par>
+    </p:tnLst>
+  </p:timing>
+</p:sld>
+</file>
+
+<file path=ppt/slides/slide11.xml><?xml version="1.0" encoding="utf-8"?>
+<p:sld xmlns:a="http://schemas.openxmlformats.org/drawingml/2006/main" xmlns:r="http://schemas.openxmlformats.org/officeDocument/2006/relationships" xmlns:p="http://schemas.openxmlformats.org/presentationml/2006/main">
+  <p:cSld>
+    <p:spTree>
+      <p:nvGrpSpPr>
+        <p:cNvPr id="1" name=""/>
+        <p:cNvGrpSpPr/>
+        <p:nvPr/>
+      </p:nvGrpSpPr>
+      <p:grpSpPr>
+        <a:xfrm>
+          <a:off x="0" y="0"/>
+          <a:ext cx="0" cy="0"/>
+          <a:chOff x="0" y="0"/>
+          <a:chExt cx="0" cy="0"/>
+        </a:xfrm>
+      </p:grpSpPr>
+      <p:sp>
+        <p:nvSpPr>
+          <p:cNvPr id="2" name="Title 1"/>
+          <p:cNvSpPr>
+            <a:spLocks noGrp="1"/>
+          </p:cNvSpPr>
+          <p:nvPr>
+            <p:ph type="title"/>
+          </p:nvPr>
+        </p:nvSpPr>
+        <p:spPr>
+          <a:xfrm>
+            <a:off x="885613" y="1058259"/>
             <a:ext cx="10058400" cy="644056"/>
           </a:xfrm>
         </p:spPr>
@@ -4957,7 +5390,7 @@
       </p:sp>
       <p:sp>
         <p:nvSpPr>
-          <p:cNvPr id="3" name="Content Placeholder 2"/>
+          <p:cNvPr id="9" name="Content Placeholder 2"/>
           <p:cNvSpPr>
             <a:spLocks noGrp="1"/>
           </p:cNvSpPr>
@@ -4965,19 +5398,217 @@
             <p:ph idx="1"/>
           </p:nvPr>
         </p:nvSpPr>
-        <p:spPr/>
+        <p:spPr>
+          <a:xfrm>
+            <a:off x="563880" y="1778001"/>
+            <a:ext cx="2467187" cy="4461932"/>
+          </a:xfrm>
+        </p:spPr>
+        <p:txBody>
+          <a:bodyPr>
+            <a:normAutofit lnSpcReduction="10000"/>
+          </a:bodyPr>
+          <a:lstStyle/>
+          <a:p>
+            <a:pPr lvl="1"/>
+            <a:r>
+              <a:rPr lang="en-US" dirty="0" smtClean="0"/>
+              <a:t>ISBN Validation</a:t>
+            </a:r>
+          </a:p>
+          <a:p>
+            <a:pPr lvl="2"/>
+            <a:r>
+              <a:rPr lang="en-US" dirty="0" smtClean="0"/>
+              <a:t>Book not added in case of invalid ISBN</a:t>
+            </a:r>
+            <a:endParaRPr lang="en-US" dirty="0" smtClean="0"/>
+          </a:p>
+          <a:p>
+            <a:pPr lvl="2"/>
+            <a:r>
+              <a:rPr lang="en-US" dirty="0" smtClean="0"/>
+              <a:t>Accepts both 10 &amp; 13 digits ISBNs </a:t>
+            </a:r>
+          </a:p>
+          <a:p>
+            <a:pPr lvl="2"/>
+            <a:r>
+              <a:rPr lang="en-US" dirty="0" smtClean="0"/>
+              <a:t>Used JavaScript regular expression to validate ISBN</a:t>
+            </a:r>
+          </a:p>
+          <a:p>
+            <a:pPr lvl="2"/>
+            <a:r>
+              <a:rPr lang="en-US" dirty="0" smtClean="0"/>
+              <a:t>Register</a:t>
+            </a:r>
+            <a:endParaRPr lang="en-US" dirty="0" smtClean="0"/>
+          </a:p>
+          <a:p>
+            <a:pPr lvl="2"/>
+            <a:r>
+              <a:rPr lang="en-US" dirty="0" smtClean="0"/>
+              <a:t>Examples of one 13 digit accepted ISBN: 978-1-4842-3896-7 </a:t>
+            </a:r>
+          </a:p>
+          <a:p>
+            <a:pPr lvl="2"/>
+            <a:r>
+              <a:rPr lang="en-US" dirty="0"/>
+              <a:t>Examples of one </a:t>
+            </a:r>
+            <a:r>
+              <a:rPr lang="en-US" dirty="0" smtClean="0"/>
+              <a:t>10 </a:t>
+            </a:r>
+            <a:r>
+              <a:rPr lang="en-US" dirty="0"/>
+              <a:t>digit accepted </a:t>
+            </a:r>
+            <a:r>
+              <a:rPr lang="en-US" dirty="0" smtClean="0"/>
+              <a:t>ISBN: 0-13-187248-6 </a:t>
+            </a:r>
+            <a:endParaRPr lang="en-US" dirty="0"/>
+          </a:p>
+          <a:p>
+            <a:pPr lvl="1"/>
+            <a:r>
+              <a:rPr lang="en-US" dirty="0" smtClean="0"/>
+              <a:t>Metadata</a:t>
+            </a:r>
+          </a:p>
+          <a:p>
+            <a:pPr lvl="2"/>
+            <a:r>
+              <a:rPr lang="en-US" dirty="0" smtClean="0"/>
+              <a:t>Can add more than one metadata tags/  topics</a:t>
+            </a:r>
+          </a:p>
+          <a:p>
+            <a:pPr lvl="2"/>
+            <a:r>
+              <a:rPr lang="en-US" dirty="0" smtClean="0"/>
+              <a:t>Accepted Format : [Topic 1], [Topic 2]</a:t>
+            </a:r>
+            <a:endParaRPr lang="en-US" dirty="0" smtClean="0"/>
+          </a:p>
+          <a:p>
+            <a:pPr lvl="2"/>
+            <a:endParaRPr lang="en-US" dirty="0"/>
+          </a:p>
+          <a:p>
+            <a:pPr marL="384048" lvl="2" indent="0">
+              <a:buNone/>
+            </a:pPr>
+            <a:endParaRPr lang="en-US" dirty="0" smtClean="0"/>
+          </a:p>
+        </p:txBody>
+      </p:sp>
+      <p:pic>
+        <p:nvPicPr>
+          <p:cNvPr id="10" name="Picture 9"/>
+          <p:cNvPicPr/>
+          <p:nvPr/>
+        </p:nvPicPr>
+        <p:blipFill>
+          <a:blip r:embed="rId3"/>
+          <a:stretch>
+            <a:fillRect/>
+          </a:stretch>
+        </p:blipFill>
+        <p:spPr>
+          <a:xfrm>
+            <a:off x="3259668" y="1778001"/>
+            <a:ext cx="8788400" cy="4538132"/>
+          </a:xfrm>
+          <a:prstGeom prst="rect">
+            <a:avLst/>
+          </a:prstGeom>
+        </p:spPr>
+      </p:pic>
+    </p:spTree>
+    <p:extLst>
+      <p:ext uri="{BB962C8B-B14F-4D97-AF65-F5344CB8AC3E}">
+        <p14:creationId xmlns:p14="http://schemas.microsoft.com/office/powerpoint/2010/main" val="1653284994"/>
+      </p:ext>
+    </p:extLst>
+  </p:cSld>
+  <p:clrMapOvr>
+    <a:masterClrMapping/>
+  </p:clrMapOvr>
+  <mc:AlternateContent xmlns:mc="http://schemas.openxmlformats.org/markup-compatibility/2006" xmlns:p15="http://schemas.microsoft.com/office/powerpoint/2012/main">
+    <mc:Choice Requires="p15">
+      <p:transition xmlns:p14="http://schemas.microsoft.com/office/powerpoint/2010/main" spd="slow" p14:dur="1250">
+        <p15:prstTrans prst="pageCurlDouble"/>
+      </p:transition>
+    </mc:Choice>
+    <mc:Fallback xmlns="">
+      <p:transition spd="slow">
+        <p:fade/>
+      </p:transition>
+    </mc:Fallback>
+  </mc:AlternateContent>
+  <p:timing>
+    <p:tnLst>
+      <p:par>
+        <p:cTn id="1" dur="indefinite" restart="never" nodeType="tmRoot"/>
+      </p:par>
+    </p:tnLst>
+  </p:timing>
+</p:sld>
+</file>
+
+<file path=ppt/slides/slide12.xml><?xml version="1.0" encoding="utf-8"?>
+<p:sld xmlns:a="http://schemas.openxmlformats.org/drawingml/2006/main" xmlns:r="http://schemas.openxmlformats.org/officeDocument/2006/relationships" xmlns:p="http://schemas.openxmlformats.org/presentationml/2006/main">
+  <p:cSld>
+    <p:spTree>
+      <p:nvGrpSpPr>
+        <p:cNvPr id="1" name=""/>
+        <p:cNvGrpSpPr/>
+        <p:nvPr/>
+      </p:nvGrpSpPr>
+      <p:grpSpPr>
+        <a:xfrm>
+          <a:off x="0" y="0"/>
+          <a:ext cx="0" cy="0"/>
+          <a:chOff x="0" y="0"/>
+          <a:chExt cx="0" cy="0"/>
+        </a:xfrm>
+      </p:grpSpPr>
+      <p:sp>
+        <p:nvSpPr>
+          <p:cNvPr id="2" name="Title 1"/>
+          <p:cNvSpPr>
+            <a:spLocks noGrp="1"/>
+          </p:cNvSpPr>
+          <p:nvPr>
+            <p:ph type="title"/>
+          </p:nvPr>
+        </p:nvSpPr>
+        <p:spPr>
+          <a:xfrm>
+            <a:off x="1152939" y="1041326"/>
+            <a:ext cx="10058400" cy="644056"/>
+          </a:xfrm>
+        </p:spPr>
         <p:txBody>
           <a:bodyPr>
             <a:normAutofit/>
           </a:bodyPr>
           <a:lstStyle/>
           <a:p>
-            <a:pPr lvl="1" algn="just"/>
-            <a:r>
-              <a:rPr lang="en-US" dirty="0" smtClean="0"/>
-              <a:t>Fully functional Recommender System</a:t>
-            </a:r>
-            <a:endParaRPr lang="en-US" dirty="0"/>
+            <a:r>
+              <a:rPr lang="en-US" sz="2800" b="1" dirty="0" smtClean="0">
+                <a:latin typeface="+mn-lt"/>
+              </a:rPr>
+              <a:t>User Interaction – Personal Section</a:t>
+            </a:r>
+            <a:endParaRPr lang="en-US" sz="2800" b="1" dirty="0">
+              <a:latin typeface="+mn-lt"/>
+            </a:endParaRPr>
           </a:p>
         </p:txBody>
       </p:sp>
@@ -5036,107 +5667,28 @@
         </p:blipFill>
         <p:spPr>
           <a:xfrm>
-            <a:off x="367749" y="1128423"/>
-            <a:ext cx="11608904" cy="5093473"/>
+            <a:off x="3750733" y="1845733"/>
+            <a:ext cx="8225920" cy="4376163"/>
           </a:xfrm>
           <a:prstGeom prst="rect">
             <a:avLst/>
           </a:prstGeom>
         </p:spPr>
       </p:pic>
-      <p:cxnSp>
-        <p:nvCxnSpPr>
-          <p:cNvPr id="6" name="Straight Connector 5"/>
-          <p:cNvCxnSpPr/>
-          <p:nvPr/>
-        </p:nvCxnSpPr>
-        <p:spPr>
-          <a:xfrm>
-            <a:off x="387626" y="897982"/>
-            <a:ext cx="11589026" cy="0"/>
-          </a:xfrm>
-          <a:prstGeom prst="line">
-            <a:avLst/>
-          </a:prstGeom>
-        </p:spPr>
-        <p:style>
-          <a:lnRef idx="1">
-            <a:schemeClr val="accent1"/>
-          </a:lnRef>
-          <a:fillRef idx="0">
-            <a:schemeClr val="accent1"/>
-          </a:fillRef>
-          <a:effectRef idx="0">
-            <a:schemeClr val="accent1"/>
-          </a:effectRef>
-          <a:fontRef idx="minor">
-            <a:schemeClr val="tx1"/>
-          </a:fontRef>
-        </p:style>
-      </p:cxnSp>
-    </p:spTree>
-    <p:extLst>
-      <p:ext uri="{BB962C8B-B14F-4D97-AF65-F5344CB8AC3E}">
-        <p14:creationId xmlns:p14="http://schemas.microsoft.com/office/powerpoint/2010/main" val="1653284994"/>
-      </p:ext>
-    </p:extLst>
-  </p:cSld>
-  <p:clrMapOvr>
-    <a:masterClrMapping/>
-  </p:clrMapOvr>
-  <mc:AlternateContent xmlns:mc="http://schemas.openxmlformats.org/markup-compatibility/2006" xmlns:p15="http://schemas.microsoft.com/office/powerpoint/2012/main">
-    <mc:Choice Requires="p15">
-      <p:transition xmlns:p14="http://schemas.microsoft.com/office/powerpoint/2010/main" spd="slow" p14:dur="1250">
-        <p15:prstTrans prst="pageCurlDouble"/>
-      </p:transition>
-    </mc:Choice>
-    <mc:Fallback xmlns="">
-      <p:transition spd="slow">
-        <p:fade/>
-      </p:transition>
-    </mc:Fallback>
-  </mc:AlternateContent>
-  <p:timing>
-    <p:tnLst>
-      <p:par>
-        <p:cTn id="1" dur="indefinite" restart="never" nodeType="tmRoot"/>
-      </p:par>
-    </p:tnLst>
-  </p:timing>
-</p:sld>
-</file>
-
-<file path=ppt/slides/slide11.xml><?xml version="1.0" encoding="utf-8"?>
-<p:sld xmlns:a="http://schemas.openxmlformats.org/drawingml/2006/main" xmlns:r="http://schemas.openxmlformats.org/officeDocument/2006/relationships" xmlns:p="http://schemas.openxmlformats.org/presentationml/2006/main">
-  <p:cSld>
-    <p:spTree>
-      <p:nvGrpSpPr>
-        <p:cNvPr id="1" name=""/>
-        <p:cNvGrpSpPr/>
-        <p:nvPr/>
-      </p:nvGrpSpPr>
-      <p:grpSpPr>
-        <a:xfrm>
-          <a:off x="0" y="0"/>
-          <a:ext cx="0" cy="0"/>
-          <a:chOff x="0" y="0"/>
-          <a:chExt cx="0" cy="0"/>
-        </a:xfrm>
-      </p:grpSpPr>
       <p:sp>
         <p:nvSpPr>
-          <p:cNvPr id="2" name="Title 1"/>
+          <p:cNvPr id="9" name="Content Placeholder 2"/>
           <p:cNvSpPr>
             <a:spLocks noGrp="1"/>
           </p:cNvSpPr>
           <p:nvPr>
-            <p:ph type="title"/>
+            <p:ph idx="1"/>
           </p:nvPr>
         </p:nvSpPr>
         <p:spPr>
           <a:xfrm>
-            <a:off x="318052" y="253926"/>
-            <a:ext cx="10058400" cy="644056"/>
+            <a:off x="1097280" y="1845734"/>
+            <a:ext cx="2467187" cy="4023360"/>
           </a:xfrm>
         </p:spPr>
         <p:txBody>
@@ -5145,343 +5697,30 @@
           </a:bodyPr>
           <a:lstStyle/>
           <a:p>
-            <a:r>
-              <a:rPr lang="en-US" sz="2800" b="1" dirty="0" smtClean="0">
-                <a:latin typeface="+mn-lt"/>
-              </a:rPr>
-              <a:t>User Interaction – Social Section</a:t>
-            </a:r>
-            <a:endParaRPr lang="en-US" sz="2800" b="1" dirty="0">
-              <a:latin typeface="+mn-lt"/>
-            </a:endParaRPr>
+            <a:pPr lvl="1"/>
+            <a:r>
+              <a:rPr lang="en-US" dirty="0" smtClean="0"/>
+              <a:t>Shows the list of books in personal library</a:t>
+            </a:r>
+          </a:p>
+          <a:p>
+            <a:pPr lvl="1"/>
+            <a:r>
+              <a:rPr lang="en-US" dirty="0"/>
+              <a:t>Topics / metadata </a:t>
+            </a:r>
+            <a:r>
+              <a:rPr lang="en-US" dirty="0" smtClean="0"/>
+              <a:t>tag can be selected for viewing books</a:t>
+            </a:r>
+            <a:endParaRPr lang="en-US" dirty="0" smtClean="0"/>
           </a:p>
         </p:txBody>
       </p:sp>
-      <p:sp>
-        <p:nvSpPr>
-          <p:cNvPr id="3" name="Content Placeholder 2"/>
-          <p:cNvSpPr>
-            <a:spLocks noGrp="1"/>
-          </p:cNvSpPr>
-          <p:nvPr>
-            <p:ph idx="1"/>
-          </p:nvPr>
-        </p:nvSpPr>
-        <p:spPr/>
-        <p:txBody>
-          <a:bodyPr>
-            <a:normAutofit/>
-          </a:bodyPr>
-          <a:lstStyle/>
-          <a:p>
-            <a:pPr lvl="1" algn="just"/>
-            <a:r>
-              <a:rPr lang="en-US" dirty="0" smtClean="0"/>
-              <a:t>Fully functional Recommender System</a:t>
-            </a:r>
-            <a:endParaRPr lang="en-US" dirty="0"/>
-          </a:p>
-        </p:txBody>
-      </p:sp>
-      <p:pic>
-        <p:nvPicPr>
-          <p:cNvPr id="4" name="Picture 6" descr="Maynooth University"/>
-          <p:cNvPicPr>
-            <a:picLocks noChangeAspect="1" noChangeArrowheads="1"/>
-          </p:cNvPicPr>
-          <p:nvPr/>
-        </p:nvPicPr>
-        <p:blipFill>
-          <a:blip r:embed="rId3">
-            <a:extLst>
-              <a:ext uri="{28A0092B-C50C-407E-A947-70E740481C1C}">
-                <a14:useLocalDpi xmlns:a14="http://schemas.microsoft.com/office/drawing/2010/main" val="0"/>
-              </a:ext>
-            </a:extLst>
-          </a:blip>
-          <a:srcRect/>
-          <a:stretch>
-            <a:fillRect/>
-          </a:stretch>
-        </p:blipFill>
-        <p:spPr bwMode="auto">
-          <a:xfrm>
-            <a:off x="10446026" y="5549569"/>
-            <a:ext cx="1530626" cy="672327"/>
-          </a:xfrm>
-          <a:prstGeom prst="rect">
-            <a:avLst/>
-          </a:prstGeom>
-          <a:noFill/>
-          <a:extLst>
-            <a:ext uri="{909E8E84-426E-40DD-AFC4-6F175D3DCCD1}">
-              <a14:hiddenFill xmlns:a14="http://schemas.microsoft.com/office/drawing/2010/main">
-                <a:solidFill>
-                  <a:srgbClr val="FFFFFF"/>
-                </a:solidFill>
-              </a14:hiddenFill>
-            </a:ext>
-          </a:extLst>
-        </p:spPr>
-      </p:pic>
-      <p:cxnSp>
-        <p:nvCxnSpPr>
-          <p:cNvPr id="6" name="Straight Connector 5"/>
-          <p:cNvCxnSpPr/>
-          <p:nvPr/>
-        </p:nvCxnSpPr>
-        <p:spPr>
-          <a:xfrm>
-            <a:off x="318052" y="897982"/>
-            <a:ext cx="11658600" cy="0"/>
-          </a:xfrm>
-          <a:prstGeom prst="line">
-            <a:avLst/>
-          </a:prstGeom>
-        </p:spPr>
-        <p:style>
-          <a:lnRef idx="1">
-            <a:schemeClr val="accent1"/>
-          </a:lnRef>
-          <a:fillRef idx="0">
-            <a:schemeClr val="accent1"/>
-          </a:fillRef>
-          <a:effectRef idx="0">
-            <a:schemeClr val="accent1"/>
-          </a:effectRef>
-          <a:fontRef idx="minor">
-            <a:schemeClr val="tx1"/>
-          </a:fontRef>
-        </p:style>
-      </p:cxnSp>
-      <p:pic>
-        <p:nvPicPr>
-          <p:cNvPr id="7" name="Picture 6"/>
-          <p:cNvPicPr/>
-          <p:nvPr/>
-        </p:nvPicPr>
-        <p:blipFill>
-          <a:blip r:embed="rId4"/>
-          <a:stretch>
-            <a:fillRect/>
-          </a:stretch>
-        </p:blipFill>
-        <p:spPr>
-          <a:xfrm>
-            <a:off x="318052" y="1063487"/>
-            <a:ext cx="11658600" cy="5158409"/>
-          </a:xfrm>
-          <a:prstGeom prst="rect">
-            <a:avLst/>
-          </a:prstGeom>
-        </p:spPr>
-      </p:pic>
     </p:spTree>
     <p:extLst>
       <p:ext uri="{BB962C8B-B14F-4D97-AF65-F5344CB8AC3E}">
-        <p14:creationId xmlns:p14="http://schemas.microsoft.com/office/powerpoint/2010/main" val="1878427128"/>
-      </p:ext>
-    </p:extLst>
-  </p:cSld>
-  <p:clrMapOvr>
-    <a:masterClrMapping/>
-  </p:clrMapOvr>
-  <mc:AlternateContent xmlns:mc="http://schemas.openxmlformats.org/markup-compatibility/2006" xmlns:p15="http://schemas.microsoft.com/office/powerpoint/2012/main">
-    <mc:Choice Requires="p15">
-      <p:transition xmlns:p14="http://schemas.microsoft.com/office/powerpoint/2010/main" spd="slow" p14:dur="1250">
-        <p15:prstTrans prst="pageCurlDouble"/>
-      </p:transition>
-    </mc:Choice>
-    <mc:Fallback xmlns="">
-      <p:transition spd="slow">
-        <p:fade/>
-      </p:transition>
-    </mc:Fallback>
-  </mc:AlternateContent>
-  <p:timing>
-    <p:tnLst>
-      <p:par>
-        <p:cTn id="1" dur="indefinite" restart="never" nodeType="tmRoot"/>
-      </p:par>
-    </p:tnLst>
-  </p:timing>
-</p:sld>
-</file>
-
-<file path=ppt/slides/slide12.xml><?xml version="1.0" encoding="utf-8"?>
-<p:sld xmlns:a="http://schemas.openxmlformats.org/drawingml/2006/main" xmlns:r="http://schemas.openxmlformats.org/officeDocument/2006/relationships" xmlns:p="http://schemas.openxmlformats.org/presentationml/2006/main">
-  <p:cSld>
-    <p:spTree>
-      <p:nvGrpSpPr>
-        <p:cNvPr id="1" name=""/>
-        <p:cNvGrpSpPr/>
-        <p:nvPr/>
-      </p:nvGrpSpPr>
-      <p:grpSpPr>
-        <a:xfrm>
-          <a:off x="0" y="0"/>
-          <a:ext cx="0" cy="0"/>
-          <a:chOff x="0" y="0"/>
-          <a:chExt cx="0" cy="0"/>
-        </a:xfrm>
-      </p:grpSpPr>
-      <p:sp>
-        <p:nvSpPr>
-          <p:cNvPr id="2" name="Title 1"/>
-          <p:cNvSpPr>
-            <a:spLocks noGrp="1"/>
-          </p:cNvSpPr>
-          <p:nvPr>
-            <p:ph type="title"/>
-          </p:nvPr>
-        </p:nvSpPr>
-        <p:spPr>
-          <a:xfrm>
-            <a:off x="278297" y="179861"/>
-            <a:ext cx="10058400" cy="644056"/>
-          </a:xfrm>
-        </p:spPr>
-        <p:txBody>
-          <a:bodyPr>
-            <a:normAutofit/>
-          </a:bodyPr>
-          <a:lstStyle/>
-          <a:p>
-            <a:r>
-              <a:rPr lang="en-US" sz="2800" b="1" dirty="0" smtClean="0">
-                <a:latin typeface="+mn-lt"/>
-              </a:rPr>
-              <a:t>User Interaction – Book Management</a:t>
-            </a:r>
-            <a:endParaRPr lang="en-US" sz="2800" b="1" dirty="0">
-              <a:latin typeface="+mn-lt"/>
-            </a:endParaRPr>
-          </a:p>
-        </p:txBody>
-      </p:sp>
-      <p:sp>
-        <p:nvSpPr>
-          <p:cNvPr id="3" name="Content Placeholder 2"/>
-          <p:cNvSpPr>
-            <a:spLocks noGrp="1"/>
-          </p:cNvSpPr>
-          <p:nvPr>
-            <p:ph idx="1"/>
-          </p:nvPr>
-        </p:nvSpPr>
-        <p:spPr/>
-        <p:txBody>
-          <a:bodyPr>
-            <a:normAutofit/>
-          </a:bodyPr>
-          <a:lstStyle/>
-          <a:p>
-            <a:pPr lvl="1" algn="just"/>
-            <a:r>
-              <a:rPr lang="en-US" dirty="0" smtClean="0"/>
-              <a:t>Fully functional Recommender System</a:t>
-            </a:r>
-            <a:endParaRPr lang="en-US" dirty="0"/>
-          </a:p>
-        </p:txBody>
-      </p:sp>
-      <p:pic>
-        <p:nvPicPr>
-          <p:cNvPr id="4" name="Picture 6" descr="Maynooth University"/>
-          <p:cNvPicPr>
-            <a:picLocks noChangeAspect="1" noChangeArrowheads="1"/>
-          </p:cNvPicPr>
-          <p:nvPr/>
-        </p:nvPicPr>
-        <p:blipFill>
-          <a:blip r:embed="rId3">
-            <a:extLst>
-              <a:ext uri="{28A0092B-C50C-407E-A947-70E740481C1C}">
-                <a14:useLocalDpi xmlns:a14="http://schemas.microsoft.com/office/drawing/2010/main" val="0"/>
-              </a:ext>
-            </a:extLst>
-          </a:blip>
-          <a:srcRect/>
-          <a:stretch>
-            <a:fillRect/>
-          </a:stretch>
-        </p:blipFill>
-        <p:spPr bwMode="auto">
-          <a:xfrm>
-            <a:off x="10446026" y="5549569"/>
-            <a:ext cx="1530626" cy="672327"/>
-          </a:xfrm>
-          <a:prstGeom prst="rect">
-            <a:avLst/>
-          </a:prstGeom>
-          <a:noFill/>
-          <a:extLst>
-            <a:ext uri="{909E8E84-426E-40DD-AFC4-6F175D3DCCD1}">
-              <a14:hiddenFill xmlns:a14="http://schemas.microsoft.com/office/drawing/2010/main">
-                <a:solidFill>
-                  <a:srgbClr val="FFFFFF"/>
-                </a:solidFill>
-              </a14:hiddenFill>
-            </a:ext>
-          </a:extLst>
-        </p:spPr>
-      </p:pic>
-      <p:cxnSp>
-        <p:nvCxnSpPr>
-          <p:cNvPr id="6" name="Straight Connector 5"/>
-          <p:cNvCxnSpPr/>
-          <p:nvPr/>
-        </p:nvCxnSpPr>
-        <p:spPr>
-          <a:xfrm>
-            <a:off x="278297" y="897982"/>
-            <a:ext cx="11698355" cy="0"/>
-          </a:xfrm>
-          <a:prstGeom prst="line">
-            <a:avLst/>
-          </a:prstGeom>
-        </p:spPr>
-        <p:style>
-          <a:lnRef idx="1">
-            <a:schemeClr val="accent1"/>
-          </a:lnRef>
-          <a:fillRef idx="0">
-            <a:schemeClr val="accent1"/>
-          </a:fillRef>
-          <a:effectRef idx="0">
-            <a:schemeClr val="accent1"/>
-          </a:effectRef>
-          <a:fontRef idx="minor">
-            <a:schemeClr val="tx1"/>
-          </a:fontRef>
-        </p:style>
-      </p:cxnSp>
-      <p:pic>
-        <p:nvPicPr>
-          <p:cNvPr id="8" name="Picture 7"/>
-          <p:cNvPicPr/>
-          <p:nvPr/>
-        </p:nvPicPr>
-        <p:blipFill>
-          <a:blip r:embed="rId4"/>
-          <a:stretch>
-            <a:fillRect/>
-          </a:stretch>
-        </p:blipFill>
-        <p:spPr>
-          <a:xfrm>
-            <a:off x="278297" y="1053548"/>
-            <a:ext cx="11698356" cy="5168347"/>
-          </a:xfrm>
-          <a:prstGeom prst="rect">
-            <a:avLst/>
-          </a:prstGeom>
-        </p:spPr>
-      </p:pic>
-    </p:spTree>
-    <p:extLst>
-      <p:ext uri="{BB962C8B-B14F-4D97-AF65-F5344CB8AC3E}">
-        <p14:creationId xmlns:p14="http://schemas.microsoft.com/office/powerpoint/2010/main" val="879222522"/>
+        <p14:creationId xmlns:p14="http://schemas.microsoft.com/office/powerpoint/2010/main" val="3438534914"/>
       </p:ext>
     </p:extLst>
   </p:cSld>
@@ -5537,6 +5776,392 @@
             <p:ph type="title"/>
           </p:nvPr>
         </p:nvSpPr>
+        <p:spPr>
+          <a:xfrm>
+            <a:off x="1152939" y="1015926"/>
+            <a:ext cx="10058400" cy="644056"/>
+          </a:xfrm>
+        </p:spPr>
+        <p:txBody>
+          <a:bodyPr>
+            <a:normAutofit/>
+          </a:bodyPr>
+          <a:lstStyle/>
+          <a:p>
+            <a:r>
+              <a:rPr lang="en-US" sz="2800" b="1" dirty="0" smtClean="0">
+                <a:latin typeface="+mn-lt"/>
+              </a:rPr>
+              <a:t>User Interaction – Social Section</a:t>
+            </a:r>
+            <a:endParaRPr lang="en-US" sz="2800" b="1" dirty="0">
+              <a:latin typeface="+mn-lt"/>
+            </a:endParaRPr>
+          </a:p>
+        </p:txBody>
+      </p:sp>
+      <p:pic>
+        <p:nvPicPr>
+          <p:cNvPr id="4" name="Picture 6" descr="Maynooth University"/>
+          <p:cNvPicPr>
+            <a:picLocks noChangeAspect="1" noChangeArrowheads="1"/>
+          </p:cNvPicPr>
+          <p:nvPr/>
+        </p:nvPicPr>
+        <p:blipFill>
+          <a:blip r:embed="rId3">
+            <a:extLst>
+              <a:ext uri="{28A0092B-C50C-407E-A947-70E740481C1C}">
+                <a14:useLocalDpi xmlns:a14="http://schemas.microsoft.com/office/drawing/2010/main" val="0"/>
+              </a:ext>
+            </a:extLst>
+          </a:blip>
+          <a:srcRect/>
+          <a:stretch>
+            <a:fillRect/>
+          </a:stretch>
+        </p:blipFill>
+        <p:spPr bwMode="auto">
+          <a:xfrm>
+            <a:off x="10446026" y="5549569"/>
+            <a:ext cx="1530626" cy="672327"/>
+          </a:xfrm>
+          <a:prstGeom prst="rect">
+            <a:avLst/>
+          </a:prstGeom>
+          <a:noFill/>
+          <a:extLst>
+            <a:ext uri="{909E8E84-426E-40DD-AFC4-6F175D3DCCD1}">
+              <a14:hiddenFill xmlns:a14="http://schemas.microsoft.com/office/drawing/2010/main">
+                <a:solidFill>
+                  <a:srgbClr val="FFFFFF"/>
+                </a:solidFill>
+              </a14:hiddenFill>
+            </a:ext>
+          </a:extLst>
+        </p:spPr>
+      </p:pic>
+      <p:pic>
+        <p:nvPicPr>
+          <p:cNvPr id="7" name="Picture 6"/>
+          <p:cNvPicPr/>
+          <p:nvPr/>
+        </p:nvPicPr>
+        <p:blipFill>
+          <a:blip r:embed="rId4"/>
+          <a:stretch>
+            <a:fillRect/>
+          </a:stretch>
+        </p:blipFill>
+        <p:spPr>
+          <a:xfrm>
+            <a:off x="3657600" y="1845733"/>
+            <a:ext cx="8449733" cy="4376163"/>
+          </a:xfrm>
+          <a:prstGeom prst="rect">
+            <a:avLst/>
+          </a:prstGeom>
+        </p:spPr>
+      </p:pic>
+      <p:sp>
+        <p:nvSpPr>
+          <p:cNvPr id="8" name="Content Placeholder 2"/>
+          <p:cNvSpPr>
+            <a:spLocks noGrp="1"/>
+          </p:cNvSpPr>
+          <p:nvPr>
+            <p:ph idx="1"/>
+          </p:nvPr>
+        </p:nvSpPr>
+        <p:spPr>
+          <a:xfrm>
+            <a:off x="1097280" y="1845734"/>
+            <a:ext cx="2467187" cy="4023360"/>
+          </a:xfrm>
+        </p:spPr>
+        <p:txBody>
+          <a:bodyPr>
+            <a:normAutofit/>
+          </a:bodyPr>
+          <a:lstStyle/>
+          <a:p>
+            <a:pPr lvl="1"/>
+            <a:r>
+              <a:rPr lang="en-US" dirty="0" smtClean="0"/>
+              <a:t>Shows the list of books in personal library</a:t>
+            </a:r>
+          </a:p>
+          <a:p>
+            <a:pPr lvl="1"/>
+            <a:r>
+              <a:rPr lang="en-US" dirty="0"/>
+              <a:t>Topics / metadata </a:t>
+            </a:r>
+            <a:r>
+              <a:rPr lang="en-US" dirty="0" smtClean="0"/>
+              <a:t>tag can be selected for viewing books</a:t>
+            </a:r>
+            <a:endParaRPr lang="en-US" dirty="0" smtClean="0"/>
+          </a:p>
+        </p:txBody>
+      </p:sp>
+    </p:spTree>
+    <p:extLst>
+      <p:ext uri="{BB962C8B-B14F-4D97-AF65-F5344CB8AC3E}">
+        <p14:creationId xmlns:p14="http://schemas.microsoft.com/office/powerpoint/2010/main" val="1878427128"/>
+      </p:ext>
+    </p:extLst>
+  </p:cSld>
+  <p:clrMapOvr>
+    <a:masterClrMapping/>
+  </p:clrMapOvr>
+  <mc:AlternateContent xmlns:mc="http://schemas.openxmlformats.org/markup-compatibility/2006" xmlns:p15="http://schemas.microsoft.com/office/powerpoint/2012/main">
+    <mc:Choice Requires="p15">
+      <p:transition xmlns:p14="http://schemas.microsoft.com/office/powerpoint/2010/main" spd="slow" p14:dur="1250">
+        <p15:prstTrans prst="pageCurlDouble"/>
+      </p:transition>
+    </mc:Choice>
+    <mc:Fallback xmlns="">
+      <p:transition spd="slow">
+        <p:fade/>
+      </p:transition>
+    </mc:Fallback>
+  </mc:AlternateContent>
+  <p:timing>
+    <p:tnLst>
+      <p:par>
+        <p:cTn id="1" dur="indefinite" restart="never" nodeType="tmRoot"/>
+      </p:par>
+    </p:tnLst>
+  </p:timing>
+</p:sld>
+</file>
+
+<file path=ppt/slides/slide14.xml><?xml version="1.0" encoding="utf-8"?>
+<p:sld xmlns:a="http://schemas.openxmlformats.org/drawingml/2006/main" xmlns:r="http://schemas.openxmlformats.org/officeDocument/2006/relationships" xmlns:p="http://schemas.openxmlformats.org/presentationml/2006/main">
+  <p:cSld>
+    <p:spTree>
+      <p:nvGrpSpPr>
+        <p:cNvPr id="1" name=""/>
+        <p:cNvGrpSpPr/>
+        <p:nvPr/>
+      </p:nvGrpSpPr>
+      <p:grpSpPr>
+        <a:xfrm>
+          <a:off x="0" y="0"/>
+          <a:ext cx="0" cy="0"/>
+          <a:chOff x="0" y="0"/>
+          <a:chExt cx="0" cy="0"/>
+        </a:xfrm>
+      </p:grpSpPr>
+      <p:sp>
+        <p:nvSpPr>
+          <p:cNvPr id="2" name="Title 1"/>
+          <p:cNvSpPr>
+            <a:spLocks noGrp="1"/>
+          </p:cNvSpPr>
+          <p:nvPr>
+            <p:ph type="title"/>
+          </p:nvPr>
+        </p:nvSpPr>
+        <p:spPr>
+          <a:xfrm>
+            <a:off x="1102139" y="1026528"/>
+            <a:ext cx="10058400" cy="644056"/>
+          </a:xfrm>
+        </p:spPr>
+        <p:txBody>
+          <a:bodyPr>
+            <a:normAutofit/>
+          </a:bodyPr>
+          <a:lstStyle/>
+          <a:p>
+            <a:r>
+              <a:rPr lang="en-US" sz="2800" b="1" dirty="0" smtClean="0">
+                <a:latin typeface="+mn-lt"/>
+              </a:rPr>
+              <a:t>User Interaction – Book Management</a:t>
+            </a:r>
+            <a:endParaRPr lang="en-US" sz="2800" b="1" dirty="0">
+              <a:latin typeface="+mn-lt"/>
+            </a:endParaRPr>
+          </a:p>
+        </p:txBody>
+      </p:sp>
+      <p:pic>
+        <p:nvPicPr>
+          <p:cNvPr id="4" name="Picture 6" descr="Maynooth University"/>
+          <p:cNvPicPr>
+            <a:picLocks noChangeAspect="1" noChangeArrowheads="1"/>
+          </p:cNvPicPr>
+          <p:nvPr/>
+        </p:nvPicPr>
+        <p:blipFill>
+          <a:blip r:embed="rId3">
+            <a:extLst>
+              <a:ext uri="{28A0092B-C50C-407E-A947-70E740481C1C}">
+                <a14:useLocalDpi xmlns:a14="http://schemas.microsoft.com/office/drawing/2010/main" val="0"/>
+              </a:ext>
+            </a:extLst>
+          </a:blip>
+          <a:srcRect/>
+          <a:stretch>
+            <a:fillRect/>
+          </a:stretch>
+        </p:blipFill>
+        <p:spPr bwMode="auto">
+          <a:xfrm>
+            <a:off x="10446026" y="5549569"/>
+            <a:ext cx="1530626" cy="672327"/>
+          </a:xfrm>
+          <a:prstGeom prst="rect">
+            <a:avLst/>
+          </a:prstGeom>
+          <a:noFill/>
+          <a:extLst>
+            <a:ext uri="{909E8E84-426E-40DD-AFC4-6F175D3DCCD1}">
+              <a14:hiddenFill xmlns:a14="http://schemas.microsoft.com/office/drawing/2010/main">
+                <a:solidFill>
+                  <a:srgbClr val="FFFFFF"/>
+                </a:solidFill>
+              </a14:hiddenFill>
+            </a:ext>
+          </a:extLst>
+        </p:spPr>
+      </p:pic>
+      <p:pic>
+        <p:nvPicPr>
+          <p:cNvPr id="8" name="Picture 7"/>
+          <p:cNvPicPr/>
+          <p:nvPr/>
+        </p:nvPicPr>
+        <p:blipFill>
+          <a:blip r:embed="rId4"/>
+          <a:stretch>
+            <a:fillRect/>
+          </a:stretch>
+        </p:blipFill>
+        <p:spPr>
+          <a:xfrm>
+            <a:off x="4952999" y="1845734"/>
+            <a:ext cx="7023653" cy="4376161"/>
+          </a:xfrm>
+          <a:prstGeom prst="rect">
+            <a:avLst/>
+          </a:prstGeom>
+        </p:spPr>
+      </p:pic>
+      <p:sp>
+        <p:nvSpPr>
+          <p:cNvPr id="9" name="Content Placeholder 2"/>
+          <p:cNvSpPr>
+            <a:spLocks noGrp="1"/>
+          </p:cNvSpPr>
+          <p:nvPr>
+            <p:ph idx="1"/>
+          </p:nvPr>
+        </p:nvSpPr>
+        <p:spPr>
+          <a:xfrm>
+            <a:off x="1097280" y="1845734"/>
+            <a:ext cx="2467187" cy="4023360"/>
+          </a:xfrm>
+        </p:spPr>
+        <p:txBody>
+          <a:bodyPr>
+            <a:normAutofit/>
+          </a:bodyPr>
+          <a:lstStyle/>
+          <a:p>
+            <a:pPr lvl="1"/>
+            <a:r>
+              <a:rPr lang="en-US" dirty="0" smtClean="0"/>
+              <a:t>Different Operations can be performed on personal library</a:t>
+            </a:r>
+          </a:p>
+          <a:p>
+            <a:pPr lvl="2"/>
+            <a:r>
+              <a:rPr lang="en-US" dirty="0" smtClean="0"/>
+              <a:t>Search books</a:t>
+            </a:r>
+            <a:endParaRPr lang="en-US" dirty="0"/>
+          </a:p>
+          <a:p>
+            <a:pPr lvl="2"/>
+            <a:r>
+              <a:rPr lang="en-US" dirty="0" smtClean="0"/>
+              <a:t>Deleted Books</a:t>
+            </a:r>
+          </a:p>
+          <a:p>
+            <a:pPr lvl="2"/>
+            <a:r>
+              <a:rPr lang="en-US" dirty="0" smtClean="0"/>
+              <a:t>Edit Books</a:t>
+            </a:r>
+          </a:p>
+        </p:txBody>
+      </p:sp>
+    </p:spTree>
+    <p:extLst>
+      <p:ext uri="{BB962C8B-B14F-4D97-AF65-F5344CB8AC3E}">
+        <p14:creationId xmlns:p14="http://schemas.microsoft.com/office/powerpoint/2010/main" val="879222522"/>
+      </p:ext>
+    </p:extLst>
+  </p:cSld>
+  <p:clrMapOvr>
+    <a:masterClrMapping/>
+  </p:clrMapOvr>
+  <mc:AlternateContent xmlns:mc="http://schemas.openxmlformats.org/markup-compatibility/2006" xmlns:p15="http://schemas.microsoft.com/office/powerpoint/2012/main">
+    <mc:Choice Requires="p15">
+      <p:transition xmlns:p14="http://schemas.microsoft.com/office/powerpoint/2010/main" spd="slow" p14:dur="1250">
+        <p15:prstTrans prst="pageCurlDouble"/>
+      </p:transition>
+    </mc:Choice>
+    <mc:Fallback xmlns="">
+      <p:transition spd="slow">
+        <p:fade/>
+      </p:transition>
+    </mc:Fallback>
+  </mc:AlternateContent>
+  <p:timing>
+    <p:tnLst>
+      <p:par>
+        <p:cTn id="1" dur="indefinite" restart="never" nodeType="tmRoot"/>
+      </p:par>
+    </p:tnLst>
+  </p:timing>
+</p:sld>
+</file>
+
+<file path=ppt/slides/slide15.xml><?xml version="1.0" encoding="utf-8"?>
+<p:sld xmlns:a="http://schemas.openxmlformats.org/drawingml/2006/main" xmlns:r="http://schemas.openxmlformats.org/officeDocument/2006/relationships" xmlns:p="http://schemas.openxmlformats.org/presentationml/2006/main">
+  <p:cSld>
+    <p:spTree>
+      <p:nvGrpSpPr>
+        <p:cNvPr id="1" name=""/>
+        <p:cNvGrpSpPr/>
+        <p:nvPr/>
+      </p:nvGrpSpPr>
+      <p:grpSpPr>
+        <a:xfrm>
+          <a:off x="0" y="0"/>
+          <a:ext cx="0" cy="0"/>
+          <a:chOff x="0" y="0"/>
+          <a:chExt cx="0" cy="0"/>
+        </a:xfrm>
+      </p:grpSpPr>
+      <p:sp>
+        <p:nvSpPr>
+          <p:cNvPr id="2" name="Title 1"/>
+          <p:cNvSpPr>
+            <a:spLocks noGrp="1"/>
+          </p:cNvSpPr>
+          <p:nvPr>
+            <p:ph type="title"/>
+          </p:nvPr>
+        </p:nvSpPr>
         <p:spPr/>
         <p:txBody>
           <a:bodyPr>
@@ -5583,7 +6208,7 @@
             <a:pPr lvl="2" algn="just"/>
             <a:r>
               <a:rPr lang="en-US" dirty="0" smtClean="0"/>
-              <a:t>Including a CSS properties block when a particular condition is met</a:t>
+              <a:t>Includes a CSS properties block when a particular condition is met</a:t>
             </a:r>
           </a:p>
           <a:p>
@@ -5604,11 +6229,11 @@
             <a:pPr lvl="1" algn="just"/>
             <a:r>
               <a:rPr lang="en-US" dirty="0" smtClean="0"/>
-              <a:t>Works </a:t>
-            </a:r>
-            <a:r>
-              <a:rPr lang="en-US" smtClean="0"/>
-              <a:t>on mobiles and tabs</a:t>
+              <a:t>Works well on </a:t>
+            </a:r>
+            <a:r>
+              <a:rPr lang="en-US" dirty="0" smtClean="0"/>
+              <a:t>mobiles and tabs</a:t>
             </a:r>
             <a:endParaRPr lang="en-US" dirty="0"/>
           </a:p>
@@ -5711,7 +6336,7 @@
 </p:sld>
 </file>
 
-<file path=ppt/slides/slide14.xml><?xml version="1.0" encoding="utf-8"?>
+<file path=ppt/slides/slide16.xml><?xml version="1.0" encoding="utf-8"?>
 <p:sld xmlns:a="http://schemas.openxmlformats.org/drawingml/2006/main" xmlns:r="http://schemas.openxmlformats.org/officeDocument/2006/relationships" xmlns:p="http://schemas.openxmlformats.org/presentationml/2006/main">
   <p:cSld>
     <p:spTree>
@@ -5883,10 +6508,17 @@
       </p:transition>
     </mc:Fallback>
   </mc:AlternateContent>
+  <p:timing>
+    <p:tnLst>
+      <p:par>
+        <p:cTn id="1" dur="indefinite" restart="never" nodeType="tmRoot"/>
+      </p:par>
+    </p:tnLst>
+  </p:timing>
 </p:sld>
 </file>
 
-<file path=ppt/slides/slide15.xml><?xml version="1.0" encoding="utf-8"?>
+<file path=ppt/slides/slide17.xml><?xml version="1.0" encoding="utf-8"?>
 <p:sld xmlns:a="http://schemas.openxmlformats.org/drawingml/2006/main" xmlns:r="http://schemas.openxmlformats.org/officeDocument/2006/relationships" xmlns:p="http://schemas.openxmlformats.org/presentationml/2006/main">
   <p:cSld>
     <p:spTree>
@@ -6070,8 +6702,8 @@
         </p:nvGrpSpPr>
         <p:grpSpPr>
           <a:xfrm>
-            <a:off x="6064467" y="1851312"/>
-            <a:ext cx="5555770" cy="3782235"/>
+            <a:off x="6400799" y="1851312"/>
+            <a:ext cx="5219437" cy="3782235"/>
             <a:chOff x="0" y="0"/>
             <a:chExt cx="5656998" cy="4667535"/>
           </a:xfrm>
@@ -8544,7 +9176,7 @@
                   <a14:useLocalDpi xmlns:a14="http://schemas.microsoft.com/office/drawing/2010/main" val="0"/>
                 </a:ext>
                 <a:ext uri="{96DAC541-7B7A-43D3-8B79-37D633B846F1}">
-                  <asvg:svgBlip xmlns="" xmlns:asvg="http://schemas.microsoft.com/office/drawing/2016/SVG/main" r:embed="rId3"/>
+                  <asvg:svgBlip xmlns:asvg="http://schemas.microsoft.com/office/drawing/2016/SVG/main" xmlns="" r:embed="rId3"/>
                 </a:ext>
               </a:extLst>
             </a:blip>
@@ -9423,10 +10055,17 @@
   <p:clrMapOvr>
     <a:masterClrMapping/>
   </p:clrMapOvr>
+  <p:timing>
+    <p:tnLst>
+      <p:par>
+        <p:cTn id="1" dur="indefinite" restart="never" nodeType="tmRoot"/>
+      </p:par>
+    </p:tnLst>
+  </p:timing>
 </p:sld>
 </file>
 
-<file path=ppt/slides/slide16.xml><?xml version="1.0" encoding="utf-8"?>
+<file path=ppt/slides/slide18.xml><?xml version="1.0" encoding="utf-8"?>
 <p:sld xmlns:a="http://schemas.openxmlformats.org/drawingml/2006/main" xmlns:r="http://schemas.openxmlformats.org/officeDocument/2006/relationships" xmlns:p="http://schemas.openxmlformats.org/presentationml/2006/main">
   <p:cSld>
     <p:spTree>
@@ -11905,7 +12544,7 @@
                   <a14:useLocalDpi xmlns:a14="http://schemas.microsoft.com/office/drawing/2010/main" val="0"/>
                 </a:ext>
                 <a:ext uri="{96DAC541-7B7A-43D3-8B79-37D633B846F1}">
-                  <asvg:svgBlip xmlns="" xmlns:asvg="http://schemas.microsoft.com/office/drawing/2016/SVG/main" r:embed="rId3"/>
+                  <asvg:svgBlip xmlns:asvg="http://schemas.microsoft.com/office/drawing/2016/SVG/main" xmlns="" r:embed="rId3"/>
                 </a:ext>
               </a:extLst>
             </a:blip>
@@ -12304,10 +12943,17 @@
   <p:clrMapOvr>
     <a:masterClrMapping/>
   </p:clrMapOvr>
+  <p:timing>
+    <p:tnLst>
+      <p:par>
+        <p:cTn id="1" dur="indefinite" restart="never" nodeType="tmRoot"/>
+      </p:par>
+    </p:tnLst>
+  </p:timing>
 </p:sld>
 </file>
 
-<file path=ppt/slides/slide17.xml><?xml version="1.0" encoding="utf-8"?>
+<file path=ppt/slides/slide19.xml><?xml version="1.0" encoding="utf-8"?>
 <p:sld xmlns:a="http://schemas.openxmlformats.org/drawingml/2006/main" xmlns:r="http://schemas.openxmlformats.org/officeDocument/2006/relationships" xmlns:p="http://schemas.openxmlformats.org/presentationml/2006/main">
   <p:cSld>
     <p:spTree>
@@ -12485,7 +13131,261 @@
 </p:sld>
 </file>
 
-<file path=ppt/slides/slide18.xml><?xml version="1.0" encoding="utf-8"?>
+<file path=ppt/slides/slide2.xml><?xml version="1.0" encoding="utf-8"?>
+<p:sld xmlns:a="http://schemas.openxmlformats.org/drawingml/2006/main" xmlns:r="http://schemas.openxmlformats.org/officeDocument/2006/relationships" xmlns:p="http://schemas.openxmlformats.org/presentationml/2006/main">
+  <p:cSld>
+    <p:spTree>
+      <p:nvGrpSpPr>
+        <p:cNvPr id="1" name=""/>
+        <p:cNvGrpSpPr/>
+        <p:nvPr/>
+      </p:nvGrpSpPr>
+      <p:grpSpPr>
+        <a:xfrm>
+          <a:off x="0" y="0"/>
+          <a:ext cx="0" cy="0"/>
+          <a:chOff x="0" y="0"/>
+          <a:chExt cx="0" cy="0"/>
+        </a:xfrm>
+      </p:grpSpPr>
+      <p:sp>
+        <p:nvSpPr>
+          <p:cNvPr id="2" name="Title 1"/>
+          <p:cNvSpPr>
+            <a:spLocks noGrp="1"/>
+          </p:cNvSpPr>
+          <p:nvPr>
+            <p:ph type="title"/>
+          </p:nvPr>
+        </p:nvSpPr>
+        <p:spPr/>
+        <p:txBody>
+          <a:bodyPr>
+            <a:normAutofit/>
+          </a:bodyPr>
+          <a:lstStyle/>
+          <a:p>
+            <a:r>
+              <a:rPr lang="en-US" sz="2800" b="1" dirty="0" smtClean="0">
+                <a:latin typeface="+mn-lt"/>
+              </a:rPr>
+              <a:t>Outline</a:t>
+            </a:r>
+            <a:endParaRPr lang="en-US" sz="2800" b="1" dirty="0">
+              <a:latin typeface="+mn-lt"/>
+            </a:endParaRPr>
+          </a:p>
+        </p:txBody>
+      </p:sp>
+      <p:sp>
+        <p:nvSpPr>
+          <p:cNvPr id="3" name="Content Placeholder 2"/>
+          <p:cNvSpPr>
+            <a:spLocks noGrp="1"/>
+          </p:cNvSpPr>
+          <p:nvPr>
+            <p:ph idx="1"/>
+          </p:nvPr>
+        </p:nvSpPr>
+        <p:spPr>
+          <a:xfrm>
+            <a:off x="1097280" y="1845734"/>
+            <a:ext cx="3653624" cy="4023360"/>
+          </a:xfrm>
+        </p:spPr>
+        <p:txBody>
+          <a:bodyPr>
+            <a:normAutofit/>
+          </a:bodyPr>
+          <a:lstStyle/>
+          <a:p>
+            <a:pPr lvl="1"/>
+            <a:r>
+              <a:rPr lang="en-US" dirty="0" smtClean="0"/>
+              <a:t>Part – I </a:t>
+            </a:r>
+          </a:p>
+          <a:p>
+            <a:pPr lvl="2"/>
+            <a:r>
+              <a:rPr lang="en-US" dirty="0" smtClean="0"/>
+              <a:t>Introduction</a:t>
+            </a:r>
+          </a:p>
+          <a:p>
+            <a:pPr lvl="2"/>
+            <a:r>
+              <a:rPr lang="en-US" dirty="0" smtClean="0"/>
+              <a:t>Technical Architecture</a:t>
+            </a:r>
+          </a:p>
+          <a:p>
+            <a:pPr lvl="2"/>
+            <a:r>
+              <a:rPr lang="en-US" dirty="0" smtClean="0"/>
+              <a:t>Technologies Used</a:t>
+            </a:r>
+          </a:p>
+          <a:p>
+            <a:pPr lvl="2"/>
+            <a:r>
+              <a:rPr lang="en-US" dirty="0" smtClean="0"/>
+              <a:t>User Stories</a:t>
+            </a:r>
+          </a:p>
+          <a:p>
+            <a:pPr lvl="1"/>
+            <a:r>
+              <a:rPr lang="en-US" dirty="0" smtClean="0"/>
+              <a:t>Part – II</a:t>
+            </a:r>
+          </a:p>
+          <a:p>
+            <a:pPr lvl="2"/>
+            <a:r>
+              <a:rPr lang="en-US" dirty="0" smtClean="0"/>
+              <a:t>Use Case Diagram</a:t>
+            </a:r>
+          </a:p>
+          <a:p>
+            <a:pPr lvl="2"/>
+            <a:r>
+              <a:rPr lang="en-US" dirty="0"/>
+              <a:t>Web App </a:t>
+            </a:r>
+            <a:r>
+              <a:rPr lang="en-US" dirty="0" smtClean="0"/>
+              <a:t>Architecture</a:t>
+            </a:r>
+          </a:p>
+          <a:p>
+            <a:pPr lvl="2"/>
+            <a:r>
+              <a:rPr lang="en-US" dirty="0" smtClean="0"/>
+              <a:t>User Interaction </a:t>
+            </a:r>
+          </a:p>
+          <a:p>
+            <a:pPr lvl="2"/>
+            <a:r>
+              <a:rPr lang="en-US" dirty="0" smtClean="0"/>
+              <a:t>Responsive Web Design</a:t>
+            </a:r>
+          </a:p>
+          <a:p>
+            <a:pPr lvl="1"/>
+            <a:r>
+              <a:rPr lang="en-US" dirty="0" smtClean="0"/>
+              <a:t>Part – III</a:t>
+            </a:r>
+          </a:p>
+          <a:p>
+            <a:pPr lvl="2"/>
+            <a:r>
+              <a:rPr lang="en-US" dirty="0" smtClean="0"/>
+              <a:t>Cloud Deployment Architecture</a:t>
+            </a:r>
+          </a:p>
+          <a:p>
+            <a:pPr lvl="2"/>
+            <a:r>
+              <a:rPr lang="en-US" dirty="0" smtClean="0"/>
+              <a:t>Agile Ideas for Project Management</a:t>
+            </a:r>
+          </a:p>
+          <a:p>
+            <a:pPr lvl="2"/>
+            <a:r>
+              <a:rPr lang="en-US" dirty="0" smtClean="0"/>
+              <a:t>MongoDB Blackmail Issue</a:t>
+            </a:r>
+          </a:p>
+          <a:p>
+            <a:pPr lvl="2"/>
+            <a:endParaRPr lang="en-US" dirty="0"/>
+          </a:p>
+          <a:p>
+            <a:pPr marL="384048" lvl="2" indent="0">
+              <a:buNone/>
+            </a:pPr>
+            <a:endParaRPr lang="en-US" dirty="0" smtClean="0"/>
+          </a:p>
+        </p:txBody>
+      </p:sp>
+      <p:pic>
+        <p:nvPicPr>
+          <p:cNvPr id="5" name="Picture 6" descr="Maynooth University"/>
+          <p:cNvPicPr>
+            <a:picLocks noChangeAspect="1" noChangeArrowheads="1"/>
+          </p:cNvPicPr>
+          <p:nvPr/>
+        </p:nvPicPr>
+        <p:blipFill>
+          <a:blip r:embed="rId3">
+            <a:extLst>
+              <a:ext uri="{28A0092B-C50C-407E-A947-70E740481C1C}">
+                <a14:useLocalDpi xmlns:a14="http://schemas.microsoft.com/office/drawing/2010/main" val="0"/>
+              </a:ext>
+            </a:extLst>
+          </a:blip>
+          <a:srcRect/>
+          <a:stretch>
+            <a:fillRect/>
+          </a:stretch>
+        </p:blipFill>
+        <p:spPr bwMode="auto">
+          <a:xfrm>
+            <a:off x="10287000" y="5549569"/>
+            <a:ext cx="1689652" cy="672327"/>
+          </a:xfrm>
+          <a:prstGeom prst="rect">
+            <a:avLst/>
+          </a:prstGeom>
+          <a:noFill/>
+          <a:extLst>
+            <a:ext uri="{909E8E84-426E-40DD-AFC4-6F175D3DCCD1}">
+              <a14:hiddenFill xmlns:a14="http://schemas.microsoft.com/office/drawing/2010/main">
+                <a:solidFill>
+                  <a:srgbClr val="FFFFFF"/>
+                </a:solidFill>
+              </a14:hiddenFill>
+            </a:ext>
+          </a:extLst>
+        </p:spPr>
+      </p:pic>
+    </p:spTree>
+    <p:extLst>
+      <p:ext uri="{BB962C8B-B14F-4D97-AF65-F5344CB8AC3E}">
+        <p14:creationId xmlns:p14="http://schemas.microsoft.com/office/powerpoint/2010/main" val="3838447121"/>
+      </p:ext>
+    </p:extLst>
+  </p:cSld>
+  <p:clrMapOvr>
+    <a:masterClrMapping/>
+  </p:clrMapOvr>
+  <mc:AlternateContent xmlns:mc="http://schemas.openxmlformats.org/markup-compatibility/2006" xmlns:p15="http://schemas.microsoft.com/office/powerpoint/2012/main">
+    <mc:Choice Requires="p15">
+      <p:transition xmlns:p14="http://schemas.microsoft.com/office/powerpoint/2010/main" spd="slow" p14:dur="1250">
+        <p15:prstTrans prst="pageCurlDouble"/>
+      </p:transition>
+    </mc:Choice>
+    <mc:Fallback xmlns="">
+      <p:transition spd="slow">
+        <p:fade/>
+      </p:transition>
+    </mc:Fallback>
+  </mc:AlternateContent>
+  <p:timing>
+    <p:tnLst>
+      <p:par>
+        <p:cTn id="1" dur="indefinite" restart="never" nodeType="tmRoot"/>
+      </p:par>
+    </p:tnLst>
+  </p:timing>
+</p:sld>
+</file>
+
+<file path=ppt/slides/slide20.xml><?xml version="1.0" encoding="utf-8"?>
 <p:sld xmlns:a="http://schemas.openxmlformats.org/drawingml/2006/main" xmlns:r="http://schemas.openxmlformats.org/officeDocument/2006/relationships" xmlns:p="http://schemas.openxmlformats.org/presentationml/2006/main">
   <p:cSld>
     <p:spTree>
@@ -12709,269 +13609,6 @@
 </p:sld>
 </file>
 
-<file path=ppt/slides/slide2.xml><?xml version="1.0" encoding="utf-8"?>
-<p:sld xmlns:a="http://schemas.openxmlformats.org/drawingml/2006/main" xmlns:r="http://schemas.openxmlformats.org/officeDocument/2006/relationships" xmlns:p="http://schemas.openxmlformats.org/presentationml/2006/main">
-  <p:cSld>
-    <p:spTree>
-      <p:nvGrpSpPr>
-        <p:cNvPr id="1" name=""/>
-        <p:cNvGrpSpPr/>
-        <p:nvPr/>
-      </p:nvGrpSpPr>
-      <p:grpSpPr>
-        <a:xfrm>
-          <a:off x="0" y="0"/>
-          <a:ext cx="0" cy="0"/>
-          <a:chOff x="0" y="0"/>
-          <a:chExt cx="0" cy="0"/>
-        </a:xfrm>
-      </p:grpSpPr>
-      <p:sp>
-        <p:nvSpPr>
-          <p:cNvPr id="2" name="Title 1"/>
-          <p:cNvSpPr>
-            <a:spLocks noGrp="1"/>
-          </p:cNvSpPr>
-          <p:nvPr>
-            <p:ph type="title"/>
-          </p:nvPr>
-        </p:nvSpPr>
-        <p:spPr/>
-        <p:txBody>
-          <a:bodyPr>
-            <a:normAutofit/>
-          </a:bodyPr>
-          <a:lstStyle/>
-          <a:p>
-            <a:r>
-              <a:rPr lang="en-US" sz="2800" b="1" dirty="0" smtClean="0">
-                <a:latin typeface="+mn-lt"/>
-              </a:rPr>
-              <a:t>Outline</a:t>
-            </a:r>
-            <a:endParaRPr lang="en-US" sz="2800" b="1" dirty="0">
-              <a:latin typeface="+mn-lt"/>
-            </a:endParaRPr>
-          </a:p>
-        </p:txBody>
-      </p:sp>
-      <p:sp>
-        <p:nvSpPr>
-          <p:cNvPr id="3" name="Content Placeholder 2"/>
-          <p:cNvSpPr>
-            <a:spLocks noGrp="1"/>
-          </p:cNvSpPr>
-          <p:nvPr>
-            <p:ph idx="1"/>
-          </p:nvPr>
-        </p:nvSpPr>
-        <p:spPr>
-          <a:xfrm>
-            <a:off x="1097280" y="1845734"/>
-            <a:ext cx="10058400" cy="4023360"/>
-          </a:xfrm>
-        </p:spPr>
-        <p:txBody>
-          <a:bodyPr>
-            <a:normAutofit/>
-          </a:bodyPr>
-          <a:lstStyle/>
-          <a:p>
-            <a:pPr lvl="1"/>
-            <a:r>
-              <a:rPr lang="en-US" dirty="0" smtClean="0"/>
-              <a:t>Part – I </a:t>
-            </a:r>
-          </a:p>
-          <a:p>
-            <a:pPr lvl="2"/>
-            <a:r>
-              <a:rPr lang="en-US" dirty="0" smtClean="0"/>
-              <a:t>Introduction</a:t>
-            </a:r>
-            <a:endParaRPr lang="en-US" dirty="0" smtClean="0"/>
-          </a:p>
-          <a:p>
-            <a:pPr lvl="2"/>
-            <a:r>
-              <a:rPr lang="en-US" dirty="0" smtClean="0"/>
-              <a:t>Technical Architecture</a:t>
-            </a:r>
-          </a:p>
-          <a:p>
-            <a:pPr lvl="2"/>
-            <a:r>
-              <a:rPr lang="en-US" dirty="0" smtClean="0"/>
-              <a:t>Technologies Used</a:t>
-            </a:r>
-          </a:p>
-          <a:p>
-            <a:pPr lvl="2"/>
-            <a:r>
-              <a:rPr lang="en-US" dirty="0" smtClean="0"/>
-              <a:t>User Stories</a:t>
-            </a:r>
-            <a:endParaRPr lang="en-US" dirty="0" smtClean="0"/>
-          </a:p>
-          <a:p>
-            <a:pPr lvl="1"/>
-            <a:r>
-              <a:rPr lang="en-US" dirty="0" smtClean="0"/>
-              <a:t>Part – II</a:t>
-            </a:r>
-          </a:p>
-          <a:p>
-            <a:pPr lvl="2"/>
-            <a:r>
-              <a:rPr lang="en-US" dirty="0" smtClean="0"/>
-              <a:t>Use Case Diagram</a:t>
-            </a:r>
-          </a:p>
-          <a:p>
-            <a:pPr lvl="2"/>
-            <a:r>
-              <a:rPr lang="en-US" dirty="0"/>
-              <a:t>Web App </a:t>
-            </a:r>
-            <a:r>
-              <a:rPr lang="en-US" dirty="0" smtClean="0"/>
-              <a:t>Architecture</a:t>
-            </a:r>
-            <a:endParaRPr lang="en-US" dirty="0" smtClean="0"/>
-          </a:p>
-          <a:p>
-            <a:pPr lvl="2"/>
-            <a:r>
-              <a:rPr lang="en-US" dirty="0" smtClean="0"/>
-              <a:t>User </a:t>
-            </a:r>
-            <a:r>
-              <a:rPr lang="en-US" dirty="0" smtClean="0"/>
-              <a:t>Interaction </a:t>
-            </a:r>
-          </a:p>
-          <a:p>
-            <a:pPr lvl="2"/>
-            <a:r>
-              <a:rPr lang="en-US" dirty="0" smtClean="0"/>
-              <a:t>Responsive Web Design</a:t>
-            </a:r>
-            <a:endParaRPr lang="en-US" dirty="0" smtClean="0"/>
-          </a:p>
-          <a:p>
-            <a:pPr lvl="1"/>
-            <a:r>
-              <a:rPr lang="en-US" dirty="0" smtClean="0"/>
-              <a:t>Part – III</a:t>
-            </a:r>
-          </a:p>
-          <a:p>
-            <a:pPr lvl="2"/>
-            <a:r>
-              <a:rPr lang="en-US" dirty="0" smtClean="0"/>
-              <a:t>Cloud Deployment Architecture</a:t>
-            </a:r>
-          </a:p>
-          <a:p>
-            <a:pPr lvl="2"/>
-            <a:r>
-              <a:rPr lang="en-US" dirty="0" smtClean="0"/>
-              <a:t>Agile Ideas for Project Management</a:t>
-            </a:r>
-          </a:p>
-          <a:p>
-            <a:pPr lvl="2"/>
-            <a:r>
-              <a:rPr lang="en-US" dirty="0" smtClean="0"/>
-              <a:t>MongoDB Blackmail Issue</a:t>
-            </a:r>
-            <a:endParaRPr lang="en-US" dirty="0" smtClean="0"/>
-          </a:p>
-          <a:p>
-            <a:pPr lvl="2"/>
-            <a:endParaRPr lang="en-US" dirty="0"/>
-          </a:p>
-          <a:p>
-            <a:pPr marL="384048" lvl="2" indent="0">
-              <a:buNone/>
-            </a:pPr>
-            <a:endParaRPr lang="en-US" dirty="0" smtClean="0"/>
-          </a:p>
-        </p:txBody>
-      </p:sp>
-      <p:pic>
-        <p:nvPicPr>
-          <p:cNvPr id="5" name="Picture 6" descr="Maynooth University"/>
-          <p:cNvPicPr>
-            <a:picLocks noChangeAspect="1" noChangeArrowheads="1"/>
-          </p:cNvPicPr>
-          <p:nvPr/>
-        </p:nvPicPr>
-        <p:blipFill>
-          <a:blip r:embed="rId3">
-            <a:extLst>
-              <a:ext uri="{28A0092B-C50C-407E-A947-70E740481C1C}">
-                <a14:useLocalDpi xmlns:a14="http://schemas.microsoft.com/office/drawing/2010/main" val="0"/>
-              </a:ext>
-            </a:extLst>
-          </a:blip>
-          <a:srcRect/>
-          <a:stretch>
-            <a:fillRect/>
-          </a:stretch>
-        </p:blipFill>
-        <p:spPr bwMode="auto">
-          <a:xfrm>
-            <a:off x="10287000" y="5549569"/>
-            <a:ext cx="1689652" cy="672327"/>
-          </a:xfrm>
-          <a:prstGeom prst="rect">
-            <a:avLst/>
-          </a:prstGeom>
-          <a:noFill/>
-          <a:extLst>
-            <a:ext uri="{909E8E84-426E-40DD-AFC4-6F175D3DCCD1}">
-              <a14:hiddenFill xmlns:a14="http://schemas.microsoft.com/office/drawing/2010/main">
-                <a:solidFill>
-                  <a:srgbClr val="FFFFFF"/>
-                </a:solidFill>
-              </a14:hiddenFill>
-            </a:ext>
-          </a:extLst>
-        </p:spPr>
-      </p:pic>
-    </p:spTree>
-    <p:extLst>
-      <p:ext uri="{BB962C8B-B14F-4D97-AF65-F5344CB8AC3E}">
-        <p14:creationId xmlns:p14="http://schemas.microsoft.com/office/powerpoint/2010/main" val="3838447121"/>
-      </p:ext>
-    </p:extLst>
-  </p:cSld>
-  <p:clrMapOvr>
-    <a:masterClrMapping/>
-  </p:clrMapOvr>
-  <mc:AlternateContent xmlns:mc="http://schemas.openxmlformats.org/markup-compatibility/2006" xmlns:p15="http://schemas.microsoft.com/office/powerpoint/2012/main">
-    <mc:Choice Requires="p15">
-      <p:transition xmlns:p14="http://schemas.microsoft.com/office/powerpoint/2010/main" spd="slow" p14:dur="1250">
-        <p15:prstTrans prst="pageCurlDouble"/>
-      </p:transition>
-    </mc:Choice>
-    <mc:Fallback xmlns="">
-      <p:transition spd="slow">
-        <p:fade/>
-      </p:transition>
-    </mc:Fallback>
-  </mc:AlternateContent>
-  <p:timing>
-    <p:tnLst>
-      <p:par>
-        <p:cTn id="1" dur="indefinite" restart="never" nodeType="tmRoot"/>
-      </p:par>
-    </p:tnLst>
-  </p:timing>
-</p:sld>
-</file>
-
 <file path=ppt/slides/slide3.xml><?xml version="1.0" encoding="utf-8"?>
 <p:sld xmlns:a="http://schemas.openxmlformats.org/drawingml/2006/main" xmlns:r="http://schemas.openxmlformats.org/officeDocument/2006/relationships" xmlns:p="http://schemas.openxmlformats.org/presentationml/2006/main">
   <p:cSld>
@@ -13007,20 +13644,11 @@
           <a:lstStyle/>
           <a:p>
             <a:r>
-              <a:rPr lang="en-US" sz="2400" b="1" dirty="0">
+              <a:rPr lang="en-US" sz="2800" b="1" dirty="0">
                 <a:latin typeface="+mn-lt"/>
               </a:rPr>
-              <a:t>Technical </a:t>
-            </a:r>
-            <a:r>
-              <a:rPr lang="en-US" sz="2400" b="1" dirty="0" smtClean="0">
-                <a:latin typeface="+mn-lt"/>
-              </a:rPr>
-              <a:t>Architecture </a:t>
-            </a:r>
-            <a:endParaRPr lang="en-US" sz="2400" b="1" dirty="0">
-              <a:latin typeface="+mn-lt"/>
-            </a:endParaRPr>
+              <a:t>Technical Architecture</a:t>
+            </a:r>
           </a:p>
         </p:txBody>
       </p:sp>
@@ -13059,36 +13687,6 @@
       </p:sp>
       <p:pic>
         <p:nvPicPr>
-          <p:cNvPr id="6" name="Picture 5">
-            <a:extLst>
-              <a:ext uri="{FF2B5EF4-FFF2-40B4-BE49-F238E27FC236}">
-                <a16:creationId xmlns:a16="http://schemas.microsoft.com/office/drawing/2014/main" id="{B4857FD1-0FAC-4D2A-B520-A999AB8D17AF}"/>
-              </a:ext>
-            </a:extLst>
-          </p:cNvPr>
-          <p:cNvPicPr>
-            <a:picLocks noChangeAspect="1"/>
-          </p:cNvPicPr>
-          <p:nvPr/>
-        </p:nvPicPr>
-        <p:blipFill>
-          <a:blip r:embed="rId2"/>
-          <a:stretch>
-            <a:fillRect/>
-          </a:stretch>
-        </p:blipFill>
-        <p:spPr>
-          <a:xfrm>
-            <a:off x="1826894" y="1900237"/>
-            <a:ext cx="8966433" cy="4321659"/>
-          </a:xfrm>
-          <a:prstGeom prst="rect">
-            <a:avLst/>
-          </a:prstGeom>
-        </p:spPr>
-      </p:pic>
-      <p:pic>
-        <p:nvPicPr>
           <p:cNvPr id="5" name="Picture 6" descr="Maynooth University"/>
           <p:cNvPicPr>
             <a:picLocks noChangeAspect="1" noChangeArrowheads="1"/>
@@ -13096,7 +13694,7 @@
           <p:nvPr/>
         </p:nvPicPr>
         <p:blipFill>
-          <a:blip r:embed="rId3">
+          <a:blip r:embed="rId2">
             <a:extLst>
               <a:ext uri="{28A0092B-C50C-407E-A947-70E740481C1C}">
                 <a14:useLocalDpi xmlns:a14="http://schemas.microsoft.com/office/drawing/2010/main" val="0"/>
@@ -13128,10 +13726,40 @@
           </a:extLst>
         </p:spPr>
       </p:pic>
+      <p:pic>
+        <p:nvPicPr>
+          <p:cNvPr id="10" name="Picture 9">
+            <a:extLst>
+              <a:ext uri="{FF2B5EF4-FFF2-40B4-BE49-F238E27FC236}">
+                <a16:creationId xmlns:a16="http://schemas.microsoft.com/office/drawing/2014/main" id="{3DB8B026-6764-4E99-99E6-9EFC4DF34273}"/>
+              </a:ext>
+            </a:extLst>
+          </p:cNvPr>
+          <p:cNvPicPr>
+            <a:picLocks noChangeAspect="1"/>
+          </p:cNvPicPr>
+          <p:nvPr/>
+        </p:nvPicPr>
+        <p:blipFill>
+          <a:blip r:embed="rId3"/>
+          <a:stretch>
+            <a:fillRect/>
+          </a:stretch>
+        </p:blipFill>
+        <p:spPr>
+          <a:xfrm>
+            <a:off x="2004923" y="1845734"/>
+            <a:ext cx="7059885" cy="4376162"/>
+          </a:xfrm>
+          <a:prstGeom prst="rect">
+            <a:avLst/>
+          </a:prstGeom>
+        </p:spPr>
+      </p:pic>
     </p:spTree>
     <p:extLst>
       <p:ext uri="{BB962C8B-B14F-4D97-AF65-F5344CB8AC3E}">
-        <p14:creationId xmlns:p14="http://schemas.microsoft.com/office/powerpoint/2010/main" val="2816994318"/>
+        <p14:creationId xmlns:p14="http://schemas.microsoft.com/office/powerpoint/2010/main" val="401468662"/>
       </p:ext>
     </p:extLst>
   </p:cSld>
@@ -13188,7 +13816,7 @@
           <a:lstStyle/>
           <a:p>
             <a:r>
-              <a:rPr lang="en-US" sz="2400" b="1" dirty="0">
+              <a:rPr lang="en-US" sz="2800" b="1" dirty="0">
                 <a:latin typeface="+mn-lt"/>
               </a:rPr>
               <a:t>Technologies Used</a:t>
@@ -13208,13 +13836,13 @@
         </p:nvSpPr>
         <p:spPr>
           <a:xfrm>
-            <a:off x="1256306" y="1862372"/>
+            <a:off x="1249680" y="1862372"/>
             <a:ext cx="10058400" cy="4023360"/>
           </a:xfrm>
         </p:spPr>
         <p:txBody>
           <a:bodyPr>
-            <a:normAutofit fontScale="85000" lnSpcReduction="20000"/>
+            <a:normAutofit/>
           </a:bodyPr>
           <a:lstStyle/>
           <a:p>
@@ -13222,39 +13850,40 @@
               <a:buNone/>
             </a:pPr>
             <a:r>
-              <a:rPr lang="en-GB" sz="2300" b="1" dirty="0">
+              <a:rPr lang="en-GB" b="1" dirty="0">
                 <a:solidFill>
                   <a:srgbClr val="FF0000"/>
                 </a:solidFill>
                 <a:latin typeface="Calibri (Body)"/>
                 <a:cs typeface="Arial"/>
               </a:rPr>
-              <a:t>Model :   </a:t>
-            </a:r>
-            <a:r>
-              <a:rPr lang="en-GB" sz="2300" b="1" dirty="0">
-                <a:latin typeface="Calibri (Body)"/>
-                <a:cs typeface="Arial"/>
-              </a:rPr>
-              <a:t>Mongoose </a:t>
-            </a:r>
-            <a:r>
-              <a:rPr lang="en-GB" sz="2300" b="1" dirty="0">
+              <a:t>Front End </a:t>
+            </a:r>
+          </a:p>
+          <a:p>
+            <a:pPr marL="0" indent="0">
+              <a:buNone/>
+            </a:pPr>
+            <a:r>
+              <a:rPr lang="en-GB" sz="3400" b="1" dirty="0">
                 <a:solidFill>
-                  <a:schemeClr val="accent1">
-                    <a:lumMod val="50000"/>
-                  </a:schemeClr>
+                  <a:srgbClr val="FF0000"/>
                 </a:solidFill>
                 <a:latin typeface="Calibri (Body)"/>
                 <a:cs typeface="Arial"/>
               </a:rPr>
-              <a:t>   </a:t>
-            </a:r>
-          </a:p>
-          <a:p>
-            <a:pPr marL="0" indent="0">
-              <a:buNone/>
-            </a:pPr>
+              <a:t>	</a:t>
+            </a:r>
+            <a:r>
+              <a:rPr lang="en-GB" sz="1800" dirty="0">
+                <a:solidFill>
+                  <a:schemeClr val="tx1"/>
+                </a:solidFill>
+                <a:latin typeface="Calibri (Body)"/>
+                <a:cs typeface="Arial"/>
+              </a:rPr>
+              <a:t>HTML/CSS + Bootstrap Framework + Java Script    </a:t>
+            </a:r>
             <a:r>
               <a:rPr lang="en-GB" sz="1800" dirty="0">
                 <a:solidFill>
@@ -13266,77 +13895,33 @@
               </a:rPr>
               <a:t>		</a:t>
             </a:r>
-            <a:r>
-              <a:rPr lang="en-GB" sz="2100" dirty="0">
-                <a:solidFill>
-                  <a:schemeClr val="tx1"/>
-                </a:solidFill>
-                <a:cs typeface="Arial"/>
-              </a:rPr>
-              <a:t>Managing Relationship between data.</a:t>
-            </a:r>
+            <a:endParaRPr lang="en-GB" sz="2600" dirty="0">
+              <a:solidFill>
+                <a:schemeClr val="tx1"/>
+              </a:solidFill>
+              <a:cs typeface="Arial"/>
+            </a:endParaRPr>
           </a:p>
           <a:p>
             <a:pPr marL="0" indent="0">
               <a:buNone/>
             </a:pPr>
             <a:r>
-              <a:rPr lang="en-GB" sz="2600" dirty="0">
-                <a:solidFill>
-                  <a:schemeClr val="tx1"/>
-                </a:solidFill>
-                <a:cs typeface="Arial"/>
-              </a:rPr>
-              <a:t>		</a:t>
-            </a:r>
-            <a:r>
-              <a:rPr lang="en-GB" sz="2100" dirty="0">
-                <a:solidFill>
-                  <a:schemeClr val="tx1"/>
-                </a:solidFill>
-                <a:cs typeface="Arial"/>
-              </a:rPr>
-              <a:t>Schema Validation</a:t>
-            </a:r>
-          </a:p>
-          <a:p>
-            <a:pPr marL="0" indent="0">
-              <a:buNone/>
-            </a:pPr>
-            <a:r>
-              <a:rPr lang="en-GB" sz="2100" dirty="0">
-                <a:solidFill>
-                  <a:schemeClr val="tx1"/>
-                </a:solidFill>
-                <a:cs typeface="Arial"/>
-              </a:rPr>
-              <a:t>		Object representation in MongoDB</a:t>
-            </a:r>
-            <a:r>
-              <a:rPr lang="en-GB" sz="2600" dirty="0">
-                <a:solidFill>
-                  <a:schemeClr val="tx1"/>
-                </a:solidFill>
-                <a:cs typeface="Arial"/>
-              </a:rPr>
-              <a:t>.</a:t>
-            </a:r>
-          </a:p>
-          <a:p>
-            <a:pPr marL="0" indent="0">
-              <a:buNone/>
-            </a:pPr>
-            <a:r>
-              <a:rPr lang="en-GB" sz="2300" b="1" dirty="0">
+              <a:rPr lang="en-GB" b="1" dirty="0">
                 <a:solidFill>
                   <a:srgbClr val="FF0000"/>
                 </a:solidFill>
                 <a:cs typeface="Arial"/>
               </a:rPr>
-              <a:t>View :</a:t>
-            </a:r>
-            <a:r>
-              <a:rPr lang="en-GB" sz="2300" b="1" dirty="0">
+              <a:t>Back End  </a:t>
+            </a:r>
+          </a:p>
+          <a:p>
+            <a:pPr marL="0" indent="0">
+              <a:buNone/>
+            </a:pPr>
+            <a:r>
+              <a:rPr lang="en-GB" sz="3400" b="1" dirty="0">
                 <a:solidFill>
                   <a:schemeClr val="accent1">
                     <a:lumMod val="50000"/>
@@ -13344,172 +13929,58 @@
                 </a:solidFill>
                 <a:cs typeface="Arial"/>
               </a:rPr>
-              <a:t>  </a:t>
-            </a:r>
-            <a:r>
-              <a:rPr lang="en-GB" sz="2300" b="1" dirty="0">
-                <a:cs typeface="Arial"/>
-              </a:rPr>
-              <a:t>HTML, CSS, Boot Strap</a:t>
-            </a:r>
-          </a:p>
-          <a:p>
-            <a:pPr marL="0" indent="0">
-              <a:buNone/>
-            </a:pPr>
-            <a:r>
-              <a:rPr lang="en-GB" sz="1900" dirty="0">
+              <a:t>	</a:t>
+            </a:r>
+            <a:r>
+              <a:rPr lang="en-GB" sz="1800" dirty="0">
                 <a:solidFill>
                   <a:schemeClr val="tx1"/>
                 </a:solidFill>
                 <a:cs typeface="Arial"/>
               </a:rPr>
-              <a:t>		</a:t>
-            </a:r>
-            <a:r>
-              <a:rPr lang="en-GB" sz="2100" b="1" dirty="0">
+              <a:t>API Service Layer  - Express JS/Node</a:t>
+            </a:r>
+          </a:p>
+          <a:p>
+            <a:pPr marL="0" indent="0">
+              <a:buNone/>
+            </a:pPr>
+            <a:r>
+              <a:rPr lang="en-GB" sz="1800" dirty="0">
                 <a:solidFill>
                   <a:schemeClr val="tx1"/>
                 </a:solidFill>
                 <a:cs typeface="Arial"/>
               </a:rPr>
-              <a:t>HTML  &amp; CSS : </a:t>
-            </a:r>
-            <a:r>
-              <a:rPr lang="en-GB" sz="2100" dirty="0">
+              <a:t>	ODM                       -  Mongoose</a:t>
+            </a:r>
+          </a:p>
+          <a:p>
+            <a:pPr marL="0" indent="0">
+              <a:buNone/>
+            </a:pPr>
+            <a:r>
+              <a:rPr lang="en-GB" b="1" dirty="0">
+                <a:solidFill>
+                  <a:srgbClr val="FF0000"/>
+                </a:solidFill>
+                <a:cs typeface="Arial"/>
+              </a:rPr>
+              <a:t>Database</a:t>
+            </a:r>
+          </a:p>
+          <a:p>
+            <a:pPr marL="0" indent="0">
+              <a:buNone/>
+            </a:pPr>
+            <a:r>
+              <a:rPr lang="en-GB" sz="1800" dirty="0">
                 <a:solidFill>
                   <a:schemeClr val="tx1"/>
                 </a:solidFill>
                 <a:cs typeface="Arial"/>
               </a:rPr>
-              <a:t>Page designing and styling  </a:t>
-            </a:r>
-          </a:p>
-          <a:p>
-            <a:pPr marL="0" indent="0">
-              <a:buNone/>
-            </a:pPr>
-            <a:r>
-              <a:rPr lang="en-GB" sz="2100" dirty="0">
-                <a:solidFill>
-                  <a:schemeClr val="tx1"/>
-                </a:solidFill>
-                <a:cs typeface="Arial"/>
-              </a:rPr>
-              <a:t>		</a:t>
-            </a:r>
-            <a:r>
-              <a:rPr lang="en-GB" sz="2100" b="1" dirty="0">
-                <a:solidFill>
-                  <a:schemeClr val="tx1"/>
-                </a:solidFill>
-                <a:cs typeface="Arial"/>
-              </a:rPr>
-              <a:t>Bootstrap</a:t>
-            </a:r>
-            <a:r>
-              <a:rPr lang="en-GB" sz="2100" dirty="0">
-                <a:solidFill>
-                  <a:schemeClr val="tx1"/>
-                </a:solidFill>
-                <a:cs typeface="Arial"/>
-              </a:rPr>
-              <a:t> : Framework</a:t>
-            </a:r>
-          </a:p>
-          <a:p>
-            <a:pPr marL="0" indent="0">
-              <a:buNone/>
-            </a:pPr>
-            <a:r>
-              <a:rPr lang="en-GB" sz="2400" b="1" dirty="0">
-                <a:solidFill>
-                  <a:srgbClr val="FF0000"/>
-                </a:solidFill>
-                <a:cs typeface="Arial"/>
-              </a:rPr>
-              <a:t>Controller :</a:t>
-            </a:r>
-            <a:r>
-              <a:rPr lang="en-GB" sz="2400" b="1" dirty="0">
-                <a:solidFill>
-                  <a:schemeClr val="accent1">
-                    <a:lumMod val="50000"/>
-                  </a:schemeClr>
-                </a:solidFill>
-                <a:cs typeface="Arial"/>
-              </a:rPr>
-              <a:t>  </a:t>
-            </a:r>
-            <a:r>
-              <a:rPr lang="en-GB" sz="2400" b="1" dirty="0">
-                <a:cs typeface="Arial"/>
-              </a:rPr>
-              <a:t>JavaScript , Express</a:t>
-            </a:r>
-          </a:p>
-          <a:p>
-            <a:pPr marL="0" indent="0">
-              <a:buNone/>
-            </a:pPr>
-            <a:r>
-              <a:rPr lang="en-GB" sz="1900" dirty="0">
-                <a:solidFill>
-                  <a:schemeClr val="tx1"/>
-                </a:solidFill>
-                <a:cs typeface="Arial"/>
-              </a:rPr>
-              <a:t>		</a:t>
-            </a:r>
-            <a:r>
-              <a:rPr lang="en-GB" sz="2100" b="1" dirty="0">
-                <a:solidFill>
-                  <a:schemeClr val="tx1"/>
-                </a:solidFill>
-                <a:cs typeface="Arial"/>
-              </a:rPr>
-              <a:t>JavaScript : </a:t>
-            </a:r>
-            <a:r>
-              <a:rPr lang="en-GB" sz="2100" dirty="0">
-                <a:solidFill>
-                  <a:schemeClr val="tx1"/>
-                </a:solidFill>
-                <a:cs typeface="Arial"/>
-              </a:rPr>
-              <a:t>Implementing functions.</a:t>
-            </a:r>
-          </a:p>
-          <a:p>
-            <a:pPr marL="0" indent="0">
-              <a:buNone/>
-            </a:pPr>
-            <a:r>
-              <a:rPr lang="en-GB" sz="2100" dirty="0">
-                <a:solidFill>
-                  <a:schemeClr val="tx1"/>
-                </a:solidFill>
-                <a:cs typeface="Arial"/>
-              </a:rPr>
-              <a:t>		</a:t>
-            </a:r>
-            <a:r>
-              <a:rPr lang="en-GB" sz="2100" b="1" dirty="0">
-                <a:solidFill>
-                  <a:schemeClr val="tx1"/>
-                </a:solidFill>
-                <a:cs typeface="Arial"/>
-              </a:rPr>
-              <a:t>Express      : </a:t>
-            </a:r>
-            <a:r>
-              <a:rPr lang="en-GB" sz="2100" dirty="0">
-                <a:solidFill>
-                  <a:schemeClr val="tx1"/>
-                </a:solidFill>
-                <a:cs typeface="Arial"/>
-              </a:rPr>
-              <a:t>API Creation        </a:t>
+              <a:t>	Mongo  DB</a:t>
             </a:r>
           </a:p>
           <a:p>
@@ -13585,7 +14056,7 @@
     </p:spTree>
     <p:extLst>
       <p:ext uri="{BB962C8B-B14F-4D97-AF65-F5344CB8AC3E}">
-        <p14:creationId xmlns:p14="http://schemas.microsoft.com/office/powerpoint/2010/main" val="4087119303"/>
+        <p14:creationId xmlns:p14="http://schemas.microsoft.com/office/powerpoint/2010/main" val="1729858524"/>
       </p:ext>
     </p:extLst>
   </p:cSld>
@@ -13642,21 +14113,11 @@
           <a:lstStyle/>
           <a:p>
             <a:r>
-              <a:rPr lang="en-US" sz="2400" b="1" spc="-100" dirty="0">
-                <a:solidFill>
-                  <a:schemeClr val="tx1"/>
-                </a:solidFill>
+              <a:rPr lang="en-US" sz="2800" b="1" dirty="0">
                 <a:latin typeface="+mn-lt"/>
-                <a:cs typeface="Arial" panose="020B0604020202020204" pitchFamily="34" charset="0"/>
               </a:rPr>
-              <a:t>User Stories</a:t>
-            </a:r>
-            <a:endParaRPr lang="en-US" sz="2400" b="1" dirty="0">
-              <a:solidFill>
-                <a:schemeClr val="tx1"/>
-              </a:solidFill>
-              <a:latin typeface="+mn-lt"/>
-            </a:endParaRPr>
+              <a:t>Jenkins</a:t>
+            </a:r>
           </a:p>
         </p:txBody>
       </p:sp>
@@ -13670,218 +14131,126 @@
             <p:ph idx="1"/>
           </p:nvPr>
         </p:nvSpPr>
-        <p:spPr>
-          <a:xfrm>
-            <a:off x="1097280" y="1861574"/>
-            <a:ext cx="10500360" cy="4789336"/>
-          </a:xfrm>
-        </p:spPr>
+        <p:spPr/>
         <p:txBody>
           <a:bodyPr>
             <a:normAutofit/>
           </a:bodyPr>
           <a:lstStyle/>
           <a:p>
-            <a:r>
-              <a:rPr lang="en-GB" b="1" dirty="0">
-                <a:cs typeface="Arial"/>
-              </a:rPr>
-              <a:t>User Management : </a:t>
-            </a:r>
-          </a:p>
-          <a:p>
-            <a:pPr marL="0" indent="0">
+            <a:pPr marL="201168" lvl="1" indent="0" algn="just">
               <a:buNone/>
             </a:pPr>
             <a:r>
-              <a:rPr lang="en-GB" sz="2100" dirty="0">
-                <a:solidFill>
-                  <a:schemeClr val="tx1"/>
-                </a:solidFill>
-                <a:cs typeface="Arial"/>
-              </a:rPr>
-              <a:t>	</a:t>
-            </a:r>
-            <a:r>
-              <a:rPr lang="en-GB" sz="1800" dirty="0">
-                <a:solidFill>
-                  <a:schemeClr val="tx1"/>
-                </a:solidFill>
-                <a:cs typeface="Arial"/>
-              </a:rPr>
-              <a:t>Registering with the </a:t>
-            </a:r>
-            <a:r>
-              <a:rPr lang="en-GB" sz="1800" b="1" dirty="0">
-                <a:solidFill>
-                  <a:schemeClr val="tx1"/>
-                </a:solidFill>
-                <a:cs typeface="Arial"/>
-              </a:rPr>
-              <a:t>username and password</a:t>
-            </a:r>
-            <a:r>
-              <a:rPr lang="en-GB" sz="1800" dirty="0">
-                <a:solidFill>
-                  <a:schemeClr val="tx1"/>
-                </a:solidFill>
-                <a:cs typeface="Arial"/>
-              </a:rPr>
-              <a:t> for portal login</a:t>
-            </a:r>
-          </a:p>
-          <a:p>
-            <a:pPr marL="0" indent="0">
+              <a:rPr lang="en-US" sz="2000" b="1" dirty="0"/>
+              <a:t>Automated Software Development Process</a:t>
+            </a:r>
+          </a:p>
+          <a:p>
+            <a:pPr marL="201168" lvl="1" indent="0" algn="just">
               <a:buNone/>
             </a:pPr>
             <a:r>
-              <a:rPr lang="en-GB" sz="1800" dirty="0">
-                <a:solidFill>
-                  <a:schemeClr val="tx1"/>
-                </a:solidFill>
-                <a:cs typeface="Arial"/>
-              </a:rPr>
-              <a:t>	User can able to login into book portal.</a:t>
-            </a:r>
-          </a:p>
-          <a:p>
-            <a:pPr marL="0" indent="0">
+              <a:rPr lang="en-US" dirty="0"/>
+              <a:t>	Used for Continuous Integration &amp; Continuous Delivery</a:t>
+            </a:r>
+          </a:p>
+          <a:p>
+            <a:pPr marL="201168" lvl="1" indent="0" algn="just">
               <a:buNone/>
             </a:pPr>
-            <a:r>
-              <a:rPr lang="en-GB" sz="1800" dirty="0">
-                <a:solidFill>
-                  <a:schemeClr val="tx1"/>
-                </a:solidFill>
-                <a:cs typeface="Arial"/>
-              </a:rPr>
-              <a:t>	Able to </a:t>
-            </a:r>
-            <a:r>
-              <a:rPr lang="en-GB" sz="1800" b="1" dirty="0">
-                <a:solidFill>
-                  <a:schemeClr val="tx1"/>
-                </a:solidFill>
-                <a:cs typeface="Arial"/>
-              </a:rPr>
-              <a:t>Reset or </a:t>
-            </a:r>
-            <a:r>
-              <a:rPr lang="en-GB" sz="1800" b="1">
-                <a:solidFill>
-                  <a:schemeClr val="tx1"/>
-                </a:solidFill>
-                <a:cs typeface="Arial"/>
-              </a:rPr>
-              <a:t>Change </a:t>
-            </a:r>
-            <a:r>
-              <a:rPr lang="en-GB" sz="1800" b="1" smtClean="0">
-                <a:solidFill>
-                  <a:schemeClr val="tx1"/>
-                </a:solidFill>
-                <a:cs typeface="Arial"/>
-              </a:rPr>
-              <a:t>password</a:t>
-            </a:r>
-          </a:p>
-          <a:p>
-            <a:pPr marL="0" indent="0">
+            <a:endParaRPr lang="en-US" dirty="0"/>
+          </a:p>
+          <a:p>
+            <a:pPr marL="201168" lvl="1" indent="0" algn="just">
               <a:buNone/>
             </a:pPr>
-            <a:endParaRPr lang="en-GB" sz="1800" dirty="0">
-              <a:solidFill>
-                <a:schemeClr val="tx1"/>
-              </a:solidFill>
-              <a:cs typeface="Arial"/>
-            </a:endParaRPr>
-          </a:p>
-          <a:p>
-            <a:pPr marL="0" indent="0">
+            <a:r>
+              <a:rPr lang="en-US" sz="2000" b="1" dirty="0"/>
+              <a:t>Continuous Integration</a:t>
+            </a:r>
+          </a:p>
+          <a:p>
+            <a:pPr marL="201168" lvl="1" indent="0" algn="just">
               <a:buNone/>
             </a:pPr>
             <a:r>
-              <a:rPr lang="en-GB" sz="2400" b="1" dirty="0">
-                <a:solidFill>
-                  <a:schemeClr val="tx1"/>
-                </a:solidFill>
-                <a:cs typeface="Arial"/>
-              </a:rPr>
-              <a:t>  </a:t>
-            </a:r>
-            <a:r>
-              <a:rPr lang="en-GB" b="1" dirty="0">
-                <a:solidFill>
-                  <a:schemeClr val="tx1"/>
-                </a:solidFill>
-                <a:cs typeface="Arial"/>
-              </a:rPr>
-              <a:t>Adding Books : </a:t>
-            </a:r>
-          </a:p>
-          <a:p>
-            <a:pPr marL="0" indent="0">
+              <a:rPr lang="en-US" sz="2400" b="1" dirty="0"/>
+              <a:t>	</a:t>
+            </a:r>
+            <a:r>
+              <a:rPr lang="en-US" dirty="0"/>
+              <a:t>Will Check any breakage if new commits were made</a:t>
+            </a:r>
+          </a:p>
+          <a:p>
+            <a:pPr marL="201168" lvl="1" indent="0" algn="just">
               <a:buNone/>
             </a:pPr>
             <a:r>
-              <a:rPr lang="en-GB" sz="1800" b="1" dirty="0">
-                <a:solidFill>
-                  <a:schemeClr val="tx1"/>
-                </a:solidFill>
-                <a:cs typeface="Arial"/>
-              </a:rPr>
-              <a:t>	Title, Author, Year, Abstract, ISBN , Personal tags </a:t>
-            </a:r>
-            <a:r>
-              <a:rPr lang="en-GB" sz="1800" dirty="0">
-                <a:solidFill>
-                  <a:schemeClr val="tx1"/>
-                </a:solidFill>
-                <a:cs typeface="Arial"/>
-              </a:rPr>
-              <a:t>are used for books adding</a:t>
-            </a:r>
-          </a:p>
-          <a:p>
-            <a:pPr marL="0" indent="0">
+              <a:rPr lang="en-US" dirty="0"/>
+              <a:t>              into the main branch             </a:t>
+            </a:r>
+          </a:p>
+          <a:p>
+            <a:pPr marL="201168" lvl="1" indent="0" algn="just">
               <a:buNone/>
             </a:pPr>
-            <a:r>
-              <a:rPr lang="en-GB" sz="1800" dirty="0">
-                <a:solidFill>
-                  <a:schemeClr val="tx1"/>
-                </a:solidFill>
-                <a:cs typeface="Arial"/>
-              </a:rPr>
+            <a:endParaRPr lang="en-US" sz="2400" b="1" dirty="0"/>
+          </a:p>
+          <a:p>
+            <a:pPr marL="201168" lvl="1" indent="0" algn="just">
+              <a:buNone/>
+            </a:pPr>
+            <a:r>
+              <a:rPr lang="en-US" sz="2000" b="1" dirty="0"/>
+              <a:t>Continuous Deployment</a:t>
+            </a:r>
+          </a:p>
+          <a:p>
+            <a:pPr marL="201168" lvl="1" indent="0" algn="just">
+              <a:buNone/>
+            </a:pPr>
+            <a:r>
+              <a:rPr lang="en-US" sz="2400" b="1" dirty="0"/>
               <a:t>	</a:t>
             </a:r>
             <a:r>
-              <a:rPr lang="en-GB" sz="3300" b="1" dirty="0">
-                <a:solidFill>
-                  <a:schemeClr val="tx1"/>
-                </a:solidFill>
-                <a:cs typeface="Arial"/>
-              </a:rPr>
-              <a:t>	</a:t>
-            </a:r>
-            <a:endParaRPr lang="en-US" sz="1800" dirty="0">
-              <a:solidFill>
-                <a:schemeClr val="tx1"/>
-              </a:solidFill>
-            </a:endParaRPr>
+              <a:rPr lang="en-US" dirty="0"/>
+              <a:t>Starts when CI gets done</a:t>
+            </a:r>
+          </a:p>
+          <a:p>
+            <a:pPr marL="201168" lvl="1" indent="0" algn="just">
+              <a:buNone/>
+            </a:pPr>
+            <a:r>
+              <a:rPr lang="en-US" dirty="0"/>
+              <a:t>	Deploy changes to the testing environment</a:t>
+            </a:r>
+          </a:p>
+          <a:p>
+            <a:pPr lvl="1" algn="just"/>
+            <a:endParaRPr lang="en-US" dirty="0"/>
+          </a:p>
+          <a:p>
+            <a:pPr marL="384048" lvl="2" indent="0" algn="just">
+              <a:buNone/>
+            </a:pPr>
+            <a:endParaRPr lang="en-US" dirty="0"/>
           </a:p>
         </p:txBody>
       </p:sp>
       <p:pic>
         <p:nvPicPr>
-          <p:cNvPr id="5" name="Picture 6" descr="Maynooth University"/>
+          <p:cNvPr id="4" name="Picture 6" descr="Maynooth University"/>
           <p:cNvPicPr>
             <a:picLocks noChangeAspect="1" noChangeArrowheads="1"/>
           </p:cNvPicPr>
           <p:nvPr/>
         </p:nvPicPr>
         <p:blipFill>
-          <a:blip r:embed="rId2">
+          <a:blip r:embed="rId3">
             <a:extLst>
               <a:ext uri="{28A0092B-C50C-407E-A947-70E740481C1C}">
                 <a14:useLocalDpi xmlns:a14="http://schemas.microsoft.com/office/drawing/2010/main" val="0"/>
@@ -13895,8 +14264,8 @@
         </p:blipFill>
         <p:spPr bwMode="auto">
           <a:xfrm>
-            <a:off x="10287000" y="5549569"/>
-            <a:ext cx="1689652" cy="672327"/>
+            <a:off x="10446026" y="5549569"/>
+            <a:ext cx="1530626" cy="672327"/>
           </a:xfrm>
           <a:prstGeom prst="rect">
             <a:avLst/>
@@ -13913,10 +14282,43 @@
           </a:extLst>
         </p:spPr>
       </p:pic>
+      <p:pic>
+        <p:nvPicPr>
+          <p:cNvPr id="6" name="Picture 5" descr="Learn How to Set Up a CI/CD Pipeline From Scratch - DZone DevOps"/>
+          <p:cNvPicPr/>
+          <p:nvPr/>
+        </p:nvPicPr>
+        <p:blipFill>
+          <a:blip r:embed="rId4" cstate="print">
+            <a:extLst>
+              <a:ext uri="{28A0092B-C50C-407E-A947-70E740481C1C}">
+                <a14:useLocalDpi xmlns:a14="http://schemas.microsoft.com/office/drawing/2010/main" val="0"/>
+              </a:ext>
+            </a:extLst>
+          </a:blip>
+          <a:srcRect/>
+          <a:stretch>
+            <a:fillRect/>
+          </a:stretch>
+        </p:blipFill>
+        <p:spPr bwMode="auto">
+          <a:xfrm>
+            <a:off x="7229391" y="2232811"/>
+            <a:ext cx="4962609" cy="2776991"/>
+          </a:xfrm>
+          <a:prstGeom prst="rect">
+            <a:avLst/>
+          </a:prstGeom>
+          <a:noFill/>
+          <a:ln>
+            <a:noFill/>
+          </a:ln>
+        </p:spPr>
+      </p:pic>
     </p:spTree>
     <p:extLst>
       <p:ext uri="{BB962C8B-B14F-4D97-AF65-F5344CB8AC3E}">
-        <p14:creationId xmlns:p14="http://schemas.microsoft.com/office/powerpoint/2010/main" val="1623938024"/>
+        <p14:creationId xmlns:p14="http://schemas.microsoft.com/office/powerpoint/2010/main" val="535666923"/>
       </p:ext>
     </p:extLst>
   </p:cSld>
@@ -13965,12 +14367,7 @@
             <p:ph type="title"/>
           </p:nvPr>
         </p:nvSpPr>
-        <p:spPr>
-          <a:xfrm>
-            <a:off x="1097280" y="286604"/>
-            <a:ext cx="10058400" cy="1282098"/>
-          </a:xfrm>
-        </p:spPr>
+        <p:spPr/>
         <p:txBody>
           <a:bodyPr>
             <a:normAutofit/>
@@ -13978,7 +14375,7 @@
           <a:lstStyle/>
           <a:p>
             <a:r>
-              <a:rPr lang="en-US" sz="2400" b="1" spc="-100" dirty="0">
+              <a:rPr lang="en-US" sz="2800" b="1" spc="-100" dirty="0">
                 <a:solidFill>
                   <a:schemeClr val="tx1"/>
                 </a:solidFill>
@@ -13987,7 +14384,7 @@
               </a:rPr>
               <a:t>User Stories</a:t>
             </a:r>
-            <a:endParaRPr lang="en-US" sz="2400" b="1" dirty="0">
+            <a:endParaRPr lang="en-US" sz="2800" b="1" dirty="0">
               <a:solidFill>
                 <a:schemeClr val="tx1"/>
               </a:solidFill>
@@ -14008,8 +14405,8 @@
         </p:nvSpPr>
         <p:spPr>
           <a:xfrm>
-            <a:off x="1210586" y="1812896"/>
-            <a:ext cx="10500360" cy="4574957"/>
+            <a:off x="1097280" y="1782061"/>
+            <a:ext cx="10500360" cy="4789336"/>
           </a:xfrm>
         </p:spPr>
         <p:txBody>
@@ -14018,6 +14415,103 @@
           </a:bodyPr>
           <a:lstStyle/>
           <a:p>
+            <a:r>
+              <a:rPr lang="en-GB" b="1" dirty="0">
+                <a:cs typeface="Arial"/>
+              </a:rPr>
+              <a:t>User Management : </a:t>
+            </a:r>
+          </a:p>
+          <a:p>
+            <a:pPr marL="0" indent="0">
+              <a:buNone/>
+            </a:pPr>
+            <a:r>
+              <a:rPr lang="en-GB" sz="2100" dirty="0">
+                <a:solidFill>
+                  <a:schemeClr val="tx1"/>
+                </a:solidFill>
+                <a:cs typeface="Arial"/>
+              </a:rPr>
+              <a:t>	</a:t>
+            </a:r>
+            <a:r>
+              <a:rPr lang="en-GB" sz="1800" dirty="0">
+                <a:solidFill>
+                  <a:schemeClr val="tx1"/>
+                </a:solidFill>
+                <a:cs typeface="Arial"/>
+              </a:rPr>
+              <a:t>Registering with the </a:t>
+            </a:r>
+            <a:r>
+              <a:rPr lang="en-GB" sz="1800" b="1" dirty="0">
+                <a:solidFill>
+                  <a:schemeClr val="tx1"/>
+                </a:solidFill>
+                <a:cs typeface="Arial"/>
+              </a:rPr>
+              <a:t>username and password</a:t>
+            </a:r>
+            <a:r>
+              <a:rPr lang="en-GB" sz="1800" dirty="0">
+                <a:solidFill>
+                  <a:schemeClr val="tx1"/>
+                </a:solidFill>
+                <a:cs typeface="Arial"/>
+              </a:rPr>
+              <a:t> for portal login</a:t>
+            </a:r>
+          </a:p>
+          <a:p>
+            <a:pPr marL="0" indent="0">
+              <a:buNone/>
+            </a:pPr>
+            <a:r>
+              <a:rPr lang="en-GB" sz="1800" dirty="0">
+                <a:solidFill>
+                  <a:schemeClr val="tx1"/>
+                </a:solidFill>
+                <a:cs typeface="Arial"/>
+              </a:rPr>
+              <a:t>	User can able to login into book portal.</a:t>
+            </a:r>
+          </a:p>
+          <a:p>
+            <a:pPr marL="0" indent="0">
+              <a:buNone/>
+            </a:pPr>
+            <a:r>
+              <a:rPr lang="en-GB" sz="1800" dirty="0">
+                <a:solidFill>
+                  <a:schemeClr val="tx1"/>
+                </a:solidFill>
+                <a:cs typeface="Arial"/>
+              </a:rPr>
+              <a:t>	Able to </a:t>
+            </a:r>
+            <a:r>
+              <a:rPr lang="en-GB" sz="1800" b="1" dirty="0">
+                <a:solidFill>
+                  <a:schemeClr val="tx1"/>
+                </a:solidFill>
+                <a:cs typeface="Arial"/>
+              </a:rPr>
+              <a:t>Reset or Change password</a:t>
+            </a:r>
+          </a:p>
+          <a:p>
+            <a:pPr marL="0" indent="0">
+              <a:buNone/>
+            </a:pPr>
+            <a:endParaRPr lang="en-GB" sz="1800" dirty="0">
+              <a:solidFill>
+                <a:schemeClr val="tx1"/>
+              </a:solidFill>
+              <a:cs typeface="Arial"/>
+            </a:endParaRPr>
+          </a:p>
+          <a:p>
             <a:pPr marL="0" indent="0">
               <a:buNone/>
             </a:pPr>
@@ -14028,10 +14522,13 @@
                 </a:solidFill>
                 <a:cs typeface="Arial"/>
               </a:rPr>
-              <a:t>Personal  Section</a:t>
-            </a:r>
-          </a:p>
-          <a:p>
+              <a:t>  Adding Books : </a:t>
+            </a:r>
+          </a:p>
+          <a:p>
+            <a:pPr marL="0" indent="0">
+              <a:buNone/>
+            </a:pPr>
             <a:r>
               <a:rPr lang="en-GB" sz="1800" b="1" dirty="0">
                 <a:solidFill>
@@ -14039,7 +14536,7 @@
                 </a:solidFill>
                 <a:cs typeface="Arial"/>
               </a:rPr>
-              <a:t>	</a:t>
+              <a:t>	Title, Author, Year, Abstract, ISBN , Personal tags </a:t>
             </a:r>
             <a:r>
               <a:rPr lang="en-GB" sz="1800" dirty="0">
@@ -14048,17 +14545,13 @@
                 </a:solidFill>
                 <a:cs typeface="Arial"/>
               </a:rPr>
-              <a:t>Books in </a:t>
-            </a:r>
-            <a:r>
-              <a:rPr lang="en-GB" sz="1800" b="1" dirty="0">
-                <a:solidFill>
-                  <a:schemeClr val="tx1"/>
-                </a:solidFill>
-                <a:cs typeface="Arial"/>
-              </a:rPr>
-              <a:t>Personal  Library </a:t>
-            </a:r>
+              <a:t>are used for books adding</a:t>
+            </a:r>
+          </a:p>
+          <a:p>
+            <a:pPr marL="0" indent="0">
+              <a:buNone/>
+            </a:pPr>
             <a:r>
               <a:rPr lang="en-GB" sz="1800" dirty="0">
                 <a:solidFill>
@@ -14066,81 +14559,10 @@
                 </a:solidFill>
                 <a:cs typeface="Arial"/>
               </a:rPr>
-              <a:t>can be viewed basic on topics/metadata tags.</a:t>
-            </a:r>
-          </a:p>
-          <a:p>
-            <a:pPr marL="0" indent="0">
-              <a:buNone/>
-            </a:pPr>
-            <a:r>
-              <a:rPr lang="en-GB" sz="1800" dirty="0">
-                <a:solidFill>
-                  <a:schemeClr val="tx1"/>
-                </a:solidFill>
-                <a:cs typeface="Arial"/>
-              </a:rPr>
-              <a:t>	Each books relate to a topic</a:t>
-            </a:r>
-          </a:p>
-          <a:p>
-            <a:pPr marL="0" indent="0">
-              <a:buNone/>
-            </a:pPr>
-            <a:r>
-              <a:rPr lang="en-GB" sz="1800" dirty="0">
-                <a:solidFill>
-                  <a:schemeClr val="tx1"/>
-                </a:solidFill>
-                <a:cs typeface="Arial"/>
-              </a:rPr>
-              <a:t>	All books under the </a:t>
-            </a:r>
-            <a:r>
-              <a:rPr lang="en-GB" sz="1800" b="1" dirty="0">
-                <a:solidFill>
-                  <a:schemeClr val="tx1"/>
-                </a:solidFill>
-                <a:cs typeface="Arial"/>
-              </a:rPr>
-              <a:t>topics</a:t>
-            </a:r>
-            <a:r>
-              <a:rPr lang="en-GB" sz="1800" dirty="0">
-                <a:solidFill>
-                  <a:schemeClr val="tx1"/>
-                </a:solidFill>
-                <a:cs typeface="Arial"/>
-              </a:rPr>
-              <a:t> are getting listed</a:t>
-            </a:r>
-          </a:p>
-          <a:p>
-            <a:pPr marL="0" indent="0">
-              <a:buNone/>
-            </a:pPr>
-            <a:r>
-              <a:rPr lang="en-GB" b="1" dirty="0">
-                <a:solidFill>
-                  <a:schemeClr val="tx1"/>
-                </a:solidFill>
-                <a:cs typeface="Arial"/>
-              </a:rPr>
-              <a:t>Social Section</a:t>
-            </a:r>
-            <a:r>
-              <a:rPr lang="en-GB" sz="2400" b="1" dirty="0">
-                <a:cs typeface="Arial"/>
-              </a:rPr>
-              <a:t>										</a:t>
-            </a:r>
-          </a:p>
-          <a:p>
-            <a:pPr marL="0" indent="0">
-              <a:buNone/>
-            </a:pPr>
-            <a:r>
-              <a:rPr lang="en-GB" sz="1800" b="1" dirty="0">
+              <a:t>	</a:t>
+            </a:r>
+            <a:r>
+              <a:rPr lang="en-GB" sz="3300" b="1" dirty="0">
                 <a:solidFill>
                   <a:schemeClr val="tx1"/>
                 </a:solidFill>
@@ -14148,85 +14570,11 @@
               </a:rPr>
               <a:t>	</a:t>
             </a:r>
-            <a:r>
-              <a:rPr lang="en-US" sz="1800" dirty="0">
-                <a:solidFill>
-                  <a:schemeClr val="tx1"/>
-                </a:solidFill>
-              </a:rPr>
-              <a:t>In Social section where </a:t>
-            </a:r>
-            <a:r>
-              <a:rPr lang="en-US" sz="1800" b="1" dirty="0">
-                <a:solidFill>
-                  <a:schemeClr val="tx1"/>
-                </a:solidFill>
-              </a:rPr>
-              <a:t>recommendation</a:t>
-            </a:r>
-            <a:r>
-              <a:rPr lang="en-US" sz="1800" dirty="0">
-                <a:solidFill>
-                  <a:schemeClr val="tx1"/>
-                </a:solidFill>
-              </a:rPr>
-              <a:t> happens if they share at least </a:t>
-            </a:r>
-            <a:r>
-              <a:rPr lang="en-US" sz="1800" b="1" dirty="0">
-                <a:solidFill>
-                  <a:schemeClr val="tx1"/>
-                </a:solidFill>
-              </a:rPr>
-              <a:t>three</a:t>
-            </a:r>
-            <a:r>
-              <a:rPr lang="en-US" sz="1800" dirty="0">
-                <a:solidFill>
-                  <a:schemeClr val="tx1"/>
-                </a:solidFill>
-              </a:rPr>
-              <a:t> books in common.</a:t>
-            </a:r>
-          </a:p>
-          <a:p>
-            <a:pPr marL="0" indent="0">
-              <a:buNone/>
-            </a:pPr>
-            <a:r>
-              <a:rPr lang="en-US" sz="1800" dirty="0">
-                <a:solidFill>
-                  <a:schemeClr val="tx1"/>
-                </a:solidFill>
-              </a:rPr>
-              <a:t>                  Nothing we can know about the user other than the books which he is interested.</a:t>
-            </a:r>
-          </a:p>
-          <a:p>
-            <a:pPr marL="0" indent="0">
-              <a:buNone/>
-            </a:pPr>
-            <a:r>
-              <a:rPr lang="en-US" b="1" dirty="0">
-                <a:solidFill>
-                  <a:schemeClr val="tx1"/>
-                </a:solidFill>
-              </a:rPr>
-              <a:t>Book Management</a:t>
-            </a:r>
-          </a:p>
-          <a:p>
-            <a:pPr marL="0" indent="0">
-              <a:buNone/>
-            </a:pPr>
-            <a:r>
-              <a:rPr lang="en-US" sz="1800" dirty="0">
-                <a:solidFill>
-                  <a:schemeClr val="tx1"/>
-                </a:solidFill>
-              </a:rPr>
-              <a:t>	User can able to Select , Update, Delete and search the books from the library portal.</a:t>
-            </a:r>
+            <a:endParaRPr lang="en-US" sz="1800" dirty="0">
+              <a:solidFill>
+                <a:schemeClr val="tx1"/>
+              </a:solidFill>
+            </a:endParaRPr>
           </a:p>
         </p:txBody>
       </p:sp>
@@ -14274,7 +14622,7 @@
     </p:spTree>
     <p:extLst>
       <p:ext uri="{BB962C8B-B14F-4D97-AF65-F5344CB8AC3E}">
-        <p14:creationId xmlns:p14="http://schemas.microsoft.com/office/powerpoint/2010/main" val="1040517311"/>
+        <p14:creationId xmlns:p14="http://schemas.microsoft.com/office/powerpoint/2010/main" val="3589239448"/>
       </p:ext>
     </p:extLst>
   </p:cSld>
@@ -14297,6 +14645,364 @@
 </file>
 
 <file path=ppt/slides/slide7.xml><?xml version="1.0" encoding="utf-8"?>
+<p:sld xmlns:a="http://schemas.openxmlformats.org/drawingml/2006/main" xmlns:r="http://schemas.openxmlformats.org/officeDocument/2006/relationships" xmlns:p="http://schemas.openxmlformats.org/presentationml/2006/main">
+  <p:cSld>
+    <p:spTree>
+      <p:nvGrpSpPr>
+        <p:cNvPr id="1" name=""/>
+        <p:cNvGrpSpPr/>
+        <p:nvPr/>
+      </p:nvGrpSpPr>
+      <p:grpSpPr>
+        <a:xfrm>
+          <a:off x="0" y="0"/>
+          <a:ext cx="0" cy="0"/>
+          <a:chOff x="0" y="0"/>
+          <a:chExt cx="0" cy="0"/>
+        </a:xfrm>
+      </p:grpSpPr>
+      <p:sp>
+        <p:nvSpPr>
+          <p:cNvPr id="2" name="Title 1"/>
+          <p:cNvSpPr>
+            <a:spLocks noGrp="1"/>
+          </p:cNvSpPr>
+          <p:nvPr>
+            <p:ph type="title"/>
+          </p:nvPr>
+        </p:nvSpPr>
+        <p:spPr>
+          <a:xfrm>
+            <a:off x="1097280" y="286604"/>
+            <a:ext cx="10058400" cy="1282098"/>
+          </a:xfrm>
+        </p:spPr>
+        <p:txBody>
+          <a:bodyPr>
+            <a:normAutofit/>
+          </a:bodyPr>
+          <a:lstStyle/>
+          <a:p>
+            <a:r>
+              <a:rPr lang="en-US" sz="2800" b="1" spc="-100" dirty="0">
+                <a:solidFill>
+                  <a:schemeClr val="tx1"/>
+                </a:solidFill>
+                <a:latin typeface="+mn-lt"/>
+                <a:cs typeface="Arial" panose="020B0604020202020204" pitchFamily="34" charset="0"/>
+              </a:rPr>
+              <a:t>User Stories</a:t>
+            </a:r>
+            <a:endParaRPr lang="en-US" sz="2800" b="1" dirty="0">
+              <a:solidFill>
+                <a:schemeClr val="tx1"/>
+              </a:solidFill>
+              <a:latin typeface="+mn-lt"/>
+            </a:endParaRPr>
+          </a:p>
+        </p:txBody>
+      </p:sp>
+      <p:sp>
+        <p:nvSpPr>
+          <p:cNvPr id="3" name="Content Placeholder 2"/>
+          <p:cNvSpPr>
+            <a:spLocks noGrp="1"/>
+          </p:cNvSpPr>
+          <p:nvPr>
+            <p:ph idx="1"/>
+          </p:nvPr>
+        </p:nvSpPr>
+        <p:spPr>
+          <a:xfrm>
+            <a:off x="1203960" y="1783079"/>
+            <a:ext cx="10500360" cy="4574957"/>
+          </a:xfrm>
+        </p:spPr>
+        <p:txBody>
+          <a:bodyPr>
+            <a:normAutofit/>
+          </a:bodyPr>
+          <a:lstStyle/>
+          <a:p>
+            <a:pPr marL="0" indent="0">
+              <a:buNone/>
+            </a:pPr>
+            <a:r>
+              <a:rPr lang="en-GB" b="1" dirty="0">
+                <a:solidFill>
+                  <a:schemeClr val="tx1"/>
+                </a:solidFill>
+                <a:cs typeface="Arial"/>
+              </a:rPr>
+              <a:t>Personal  Section</a:t>
+            </a:r>
+          </a:p>
+          <a:p>
+            <a:r>
+              <a:rPr lang="en-GB" sz="1800" b="1" dirty="0">
+                <a:solidFill>
+                  <a:schemeClr val="tx1"/>
+                </a:solidFill>
+                <a:cs typeface="Arial"/>
+              </a:rPr>
+              <a:t>	</a:t>
+            </a:r>
+            <a:r>
+              <a:rPr lang="en-GB" sz="1800" dirty="0">
+                <a:solidFill>
+                  <a:schemeClr val="tx1"/>
+                </a:solidFill>
+                <a:cs typeface="Arial"/>
+              </a:rPr>
+              <a:t>Books in </a:t>
+            </a:r>
+            <a:r>
+              <a:rPr lang="en-GB" sz="1800" b="1" dirty="0">
+                <a:solidFill>
+                  <a:schemeClr val="tx1"/>
+                </a:solidFill>
+                <a:cs typeface="Arial"/>
+              </a:rPr>
+              <a:t>Personal  Library </a:t>
+            </a:r>
+            <a:r>
+              <a:rPr lang="en-GB" sz="1800" dirty="0">
+                <a:solidFill>
+                  <a:schemeClr val="tx1"/>
+                </a:solidFill>
+                <a:cs typeface="Arial"/>
+              </a:rPr>
+              <a:t>can be viewed basic on topics/metadata tags.</a:t>
+            </a:r>
+          </a:p>
+          <a:p>
+            <a:pPr marL="0" indent="0">
+              <a:buNone/>
+            </a:pPr>
+            <a:r>
+              <a:rPr lang="en-GB" sz="1800" dirty="0">
+                <a:solidFill>
+                  <a:schemeClr val="tx1"/>
+                </a:solidFill>
+                <a:cs typeface="Arial"/>
+              </a:rPr>
+              <a:t>	Each books relate to a topic</a:t>
+            </a:r>
+          </a:p>
+          <a:p>
+            <a:pPr marL="0" indent="0">
+              <a:buNone/>
+            </a:pPr>
+            <a:r>
+              <a:rPr lang="en-GB" sz="1800" dirty="0">
+                <a:solidFill>
+                  <a:schemeClr val="tx1"/>
+                </a:solidFill>
+                <a:cs typeface="Arial"/>
+              </a:rPr>
+              <a:t>	All books under the </a:t>
+            </a:r>
+            <a:r>
+              <a:rPr lang="en-GB" sz="1800" b="1" dirty="0">
+                <a:solidFill>
+                  <a:schemeClr val="tx1"/>
+                </a:solidFill>
+                <a:cs typeface="Arial"/>
+              </a:rPr>
+              <a:t>topics</a:t>
+            </a:r>
+            <a:r>
+              <a:rPr lang="en-GB" sz="1800" dirty="0">
+                <a:solidFill>
+                  <a:schemeClr val="tx1"/>
+                </a:solidFill>
+                <a:cs typeface="Arial"/>
+              </a:rPr>
+              <a:t> are getting listed</a:t>
+            </a:r>
+          </a:p>
+          <a:p>
+            <a:pPr marL="0" indent="0">
+              <a:buNone/>
+            </a:pPr>
+            <a:r>
+              <a:rPr lang="en-GB" b="1" dirty="0">
+                <a:solidFill>
+                  <a:schemeClr val="tx1"/>
+                </a:solidFill>
+                <a:cs typeface="Arial"/>
+              </a:rPr>
+              <a:t>Social Section</a:t>
+            </a:r>
+            <a:r>
+              <a:rPr lang="en-GB" b="1" dirty="0">
+                <a:cs typeface="Arial"/>
+              </a:rPr>
+              <a:t>										</a:t>
+            </a:r>
+          </a:p>
+          <a:p>
+            <a:pPr marL="0" indent="0">
+              <a:buNone/>
+            </a:pPr>
+            <a:r>
+              <a:rPr lang="en-GB" sz="1800" b="1" dirty="0">
+                <a:solidFill>
+                  <a:schemeClr val="tx1"/>
+                </a:solidFill>
+                <a:cs typeface="Arial"/>
+              </a:rPr>
+              <a:t>	</a:t>
+            </a:r>
+            <a:r>
+              <a:rPr lang="en-US" sz="1800" dirty="0">
+                <a:solidFill>
+                  <a:schemeClr val="tx1"/>
+                </a:solidFill>
+              </a:rPr>
+              <a:t>In Social section where </a:t>
+            </a:r>
+            <a:r>
+              <a:rPr lang="en-US" sz="1800" b="1" dirty="0">
+                <a:solidFill>
+                  <a:schemeClr val="tx1"/>
+                </a:solidFill>
+              </a:rPr>
+              <a:t>recommendation</a:t>
+            </a:r>
+            <a:r>
+              <a:rPr lang="en-US" sz="1800" dirty="0">
+                <a:solidFill>
+                  <a:schemeClr val="tx1"/>
+                </a:solidFill>
+              </a:rPr>
+              <a:t> happens if they share at least </a:t>
+            </a:r>
+            <a:r>
+              <a:rPr lang="en-US" sz="1800" b="1" dirty="0">
+                <a:solidFill>
+                  <a:schemeClr val="tx1"/>
+                </a:solidFill>
+              </a:rPr>
+              <a:t>three</a:t>
+            </a:r>
+            <a:r>
+              <a:rPr lang="en-US" sz="1800" dirty="0">
+                <a:solidFill>
+                  <a:schemeClr val="tx1"/>
+                </a:solidFill>
+              </a:rPr>
+              <a:t> books in common.</a:t>
+            </a:r>
+          </a:p>
+          <a:p>
+            <a:pPr marL="0" indent="0">
+              <a:buNone/>
+            </a:pPr>
+            <a:r>
+              <a:rPr lang="en-US" sz="1800" dirty="0">
+                <a:solidFill>
+                  <a:schemeClr val="tx1"/>
+                </a:solidFill>
+              </a:rPr>
+              <a:t>                  Nothing we can know about the user other than the books which he is interested.</a:t>
+            </a:r>
+          </a:p>
+          <a:p>
+            <a:pPr marL="0" indent="0">
+              <a:buNone/>
+            </a:pPr>
+            <a:r>
+              <a:rPr lang="en-US" b="1" dirty="0">
+                <a:solidFill>
+                  <a:schemeClr val="tx1"/>
+                </a:solidFill>
+              </a:rPr>
+              <a:t>Book Management</a:t>
+            </a:r>
+          </a:p>
+          <a:p>
+            <a:pPr marL="0" indent="0">
+              <a:buNone/>
+            </a:pPr>
+            <a:r>
+              <a:rPr lang="en-US" sz="1800" dirty="0">
+                <a:solidFill>
+                  <a:schemeClr val="tx1"/>
+                </a:solidFill>
+              </a:rPr>
+              <a:t>	User can able to Select , Update, Delete and search the books from the library portal.</a:t>
+            </a:r>
+          </a:p>
+        </p:txBody>
+      </p:sp>
+      <p:pic>
+        <p:nvPicPr>
+          <p:cNvPr id="5" name="Picture 6" descr="Maynooth University"/>
+          <p:cNvPicPr>
+            <a:picLocks noChangeAspect="1" noChangeArrowheads="1"/>
+          </p:cNvPicPr>
+          <p:nvPr/>
+        </p:nvPicPr>
+        <p:blipFill>
+          <a:blip r:embed="rId2">
+            <a:extLst>
+              <a:ext uri="{28A0092B-C50C-407E-A947-70E740481C1C}">
+                <a14:useLocalDpi xmlns:a14="http://schemas.microsoft.com/office/drawing/2010/main" val="0"/>
+              </a:ext>
+            </a:extLst>
+          </a:blip>
+          <a:srcRect/>
+          <a:stretch>
+            <a:fillRect/>
+          </a:stretch>
+        </p:blipFill>
+        <p:spPr bwMode="auto">
+          <a:xfrm>
+            <a:off x="10287000" y="5549569"/>
+            <a:ext cx="1689652" cy="672327"/>
+          </a:xfrm>
+          <a:prstGeom prst="rect">
+            <a:avLst/>
+          </a:prstGeom>
+          <a:noFill/>
+          <a:extLst>
+            <a:ext uri="{909E8E84-426E-40DD-AFC4-6F175D3DCCD1}">
+              <a14:hiddenFill xmlns:a14="http://schemas.microsoft.com/office/drawing/2010/main">
+                <a:solidFill>
+                  <a:srgbClr val="FFFFFF"/>
+                </a:solidFill>
+              </a14:hiddenFill>
+            </a:ext>
+          </a:extLst>
+        </p:spPr>
+      </p:pic>
+    </p:spTree>
+    <p:extLst>
+      <p:ext uri="{BB962C8B-B14F-4D97-AF65-F5344CB8AC3E}">
+        <p14:creationId xmlns:p14="http://schemas.microsoft.com/office/powerpoint/2010/main" val="3023986366"/>
+      </p:ext>
+    </p:extLst>
+  </p:cSld>
+  <p:clrMapOvr>
+    <a:masterClrMapping/>
+  </p:clrMapOvr>
+  <mc:AlternateContent xmlns:mc="http://schemas.openxmlformats.org/markup-compatibility/2006" xmlns:p15="http://schemas.microsoft.com/office/powerpoint/2012/main">
+    <mc:Choice Requires="p15">
+      <p:transition xmlns:p14="http://schemas.microsoft.com/office/powerpoint/2010/main" spd="slow" p14:dur="1250">
+        <p15:prstTrans prst="pageCurlDouble"/>
+      </p:transition>
+    </mc:Choice>
+    <mc:Fallback xmlns="">
+      <p:transition spd="slow">
+        <p:fade/>
+      </p:transition>
+    </mc:Fallback>
+  </mc:AlternateContent>
+</p:sld>
+</file>
+
+<file path=ppt/slides/slide8.xml><?xml version="1.0" encoding="utf-8"?>
 <p:sld xmlns:a="http://schemas.openxmlformats.org/drawingml/2006/main" xmlns:r="http://schemas.openxmlformats.org/officeDocument/2006/relationships" xmlns:p="http://schemas.openxmlformats.org/presentationml/2006/main">
   <p:cSld>
     <p:spTree>
@@ -14478,191 +15184,6 @@
 </p:sld>
 </file>
 
-<file path=ppt/slides/slide8.xml><?xml version="1.0" encoding="utf-8"?>
-<p:sld xmlns:a="http://schemas.openxmlformats.org/drawingml/2006/main" xmlns:r="http://schemas.openxmlformats.org/officeDocument/2006/relationships" xmlns:p="http://schemas.openxmlformats.org/presentationml/2006/main">
-  <p:cSld>
-    <p:spTree>
-      <p:nvGrpSpPr>
-        <p:cNvPr id="1" name=""/>
-        <p:cNvGrpSpPr/>
-        <p:nvPr/>
-      </p:nvGrpSpPr>
-      <p:grpSpPr>
-        <a:xfrm>
-          <a:off x="0" y="0"/>
-          <a:ext cx="0" cy="0"/>
-          <a:chOff x="0" y="0"/>
-          <a:chExt cx="0" cy="0"/>
-        </a:xfrm>
-      </p:grpSpPr>
-      <p:sp>
-        <p:nvSpPr>
-          <p:cNvPr id="2" name="Title 1"/>
-          <p:cNvSpPr>
-            <a:spLocks noGrp="1"/>
-          </p:cNvSpPr>
-          <p:nvPr>
-            <p:ph type="title"/>
-          </p:nvPr>
-        </p:nvSpPr>
-        <p:spPr>
-          <a:xfrm>
-            <a:off x="1097280" y="269009"/>
-            <a:ext cx="10847545" cy="627575"/>
-          </a:xfrm>
-        </p:spPr>
-        <p:txBody>
-          <a:bodyPr>
-            <a:normAutofit/>
-          </a:bodyPr>
-          <a:lstStyle/>
-          <a:p>
-            <a:r>
-              <a:rPr lang="en-US" sz="2400" b="1" dirty="0" smtClean="0">
-                <a:latin typeface="+mn-lt"/>
-              </a:rPr>
-              <a:t>Use Case Diagram</a:t>
-            </a:r>
-            <a:endParaRPr lang="en-US" sz="2400" b="1" dirty="0">
-              <a:latin typeface="+mn-lt"/>
-            </a:endParaRPr>
-          </a:p>
-        </p:txBody>
-      </p:sp>
-      <p:sp>
-        <p:nvSpPr>
-          <p:cNvPr id="5" name="Content Placeholder 4"/>
-          <p:cNvSpPr>
-            <a:spLocks noGrp="1"/>
-          </p:cNvSpPr>
-          <p:nvPr>
-            <p:ph idx="1"/>
-          </p:nvPr>
-        </p:nvSpPr>
-        <p:spPr/>
-        <p:txBody>
-          <a:bodyPr/>
-          <a:lstStyle/>
-          <a:p>
-            <a:endParaRPr lang="en-US"/>
-          </a:p>
-        </p:txBody>
-      </p:sp>
-      <p:pic>
-        <p:nvPicPr>
-          <p:cNvPr id="3" name="Picture 2"/>
-          <p:cNvPicPr>
-            <a:picLocks noChangeAspect="1"/>
-          </p:cNvPicPr>
-          <p:nvPr/>
-        </p:nvPicPr>
-        <p:blipFill>
-          <a:blip r:embed="rId2"/>
-          <a:stretch>
-            <a:fillRect/>
-          </a:stretch>
-        </p:blipFill>
-        <p:spPr>
-          <a:xfrm>
-            <a:off x="1097281" y="1137627"/>
-            <a:ext cx="10153816" cy="5084269"/>
-          </a:xfrm>
-          <a:prstGeom prst="rect">
-            <a:avLst/>
-          </a:prstGeom>
-        </p:spPr>
-      </p:pic>
-      <p:pic>
-        <p:nvPicPr>
-          <p:cNvPr id="7" name="Picture 6" descr="Maynooth University"/>
-          <p:cNvPicPr>
-            <a:picLocks noChangeAspect="1" noChangeArrowheads="1"/>
-          </p:cNvPicPr>
-          <p:nvPr/>
-        </p:nvPicPr>
-        <p:blipFill>
-          <a:blip r:embed="rId3">
-            <a:extLst>
-              <a:ext uri="{28A0092B-C50C-407E-A947-70E740481C1C}">
-                <a14:useLocalDpi xmlns:a14="http://schemas.microsoft.com/office/drawing/2010/main" val="0"/>
-              </a:ext>
-            </a:extLst>
-          </a:blip>
-          <a:srcRect/>
-          <a:stretch>
-            <a:fillRect/>
-          </a:stretch>
-        </p:blipFill>
-        <p:spPr bwMode="auto">
-          <a:xfrm>
-            <a:off x="10255173" y="5549569"/>
-            <a:ext cx="1689652" cy="672327"/>
-          </a:xfrm>
-          <a:prstGeom prst="rect">
-            <a:avLst/>
-          </a:prstGeom>
-          <a:noFill/>
-          <a:extLst>
-            <a:ext uri="{909E8E84-426E-40DD-AFC4-6F175D3DCCD1}">
-              <a14:hiddenFill xmlns:a14="http://schemas.microsoft.com/office/drawing/2010/main">
-                <a:solidFill>
-                  <a:srgbClr val="FFFFFF"/>
-                </a:solidFill>
-              </a14:hiddenFill>
-            </a:ext>
-          </a:extLst>
-        </p:spPr>
-      </p:pic>
-      <p:cxnSp>
-        <p:nvCxnSpPr>
-          <p:cNvPr id="8" name="Straight Connector 7"/>
-          <p:cNvCxnSpPr/>
-          <p:nvPr/>
-        </p:nvCxnSpPr>
-        <p:spPr>
-          <a:xfrm>
-            <a:off x="1146976" y="1017105"/>
-            <a:ext cx="9959008" cy="0"/>
-          </a:xfrm>
-          <a:prstGeom prst="line">
-            <a:avLst/>
-          </a:prstGeom>
-        </p:spPr>
-        <p:style>
-          <a:lnRef idx="1">
-            <a:schemeClr val="accent1"/>
-          </a:lnRef>
-          <a:fillRef idx="0">
-            <a:schemeClr val="accent1"/>
-          </a:fillRef>
-          <a:effectRef idx="0">
-            <a:schemeClr val="accent1"/>
-          </a:effectRef>
-          <a:fontRef idx="minor">
-            <a:schemeClr val="tx1"/>
-          </a:fontRef>
-        </p:style>
-      </p:cxnSp>
-    </p:spTree>
-    <p:extLst>
-      <p:ext uri="{BB962C8B-B14F-4D97-AF65-F5344CB8AC3E}">
-        <p14:creationId xmlns:p14="http://schemas.microsoft.com/office/powerpoint/2010/main" val="1581142524"/>
-      </p:ext>
-    </p:extLst>
-  </p:cSld>
-  <p:clrMapOvr>
-    <a:masterClrMapping/>
-  </p:clrMapOvr>
-  <p:timing>
-    <p:tnLst>
-      <p:par>
-        <p:cTn id="1" dur="indefinite" restart="never" nodeType="tmRoot"/>
-      </p:par>
-    </p:tnLst>
-  </p:timing>
-</p:sld>
-</file>
-
 <file path=ppt/slides/slide9.xml><?xml version="1.0" encoding="utf-8"?>
 <p:sld xmlns:a="http://schemas.openxmlformats.org/drawingml/2006/main" xmlns:r="http://schemas.openxmlformats.org/officeDocument/2006/relationships" xmlns:p="http://schemas.openxmlformats.org/presentationml/2006/main">
   <p:cSld>
@@ -14692,8 +15213,8 @@
         </p:nvSpPr>
         <p:spPr>
           <a:xfrm>
-            <a:off x="4740965" y="119269"/>
-            <a:ext cx="3061252" cy="499019"/>
+            <a:off x="1205948" y="1137627"/>
+            <a:ext cx="2351597" cy="627575"/>
           </a:xfrm>
         </p:spPr>
         <p:txBody>
@@ -14706,7 +15227,7 @@
               <a:rPr lang="en-US" sz="2400" b="1" dirty="0" smtClean="0">
                 <a:latin typeface="+mn-lt"/>
               </a:rPr>
-              <a:t>Web App Architecture</a:t>
+              <a:t>Use Case Diagram</a:t>
             </a:r>
             <a:endParaRPr lang="en-US" sz="2400" b="1" dirty="0">
               <a:latin typeface="+mn-lt"/>
@@ -14714,9 +15235,33 @@
           </a:p>
         </p:txBody>
       </p:sp>
+      <p:pic>
+        <p:nvPicPr>
+          <p:cNvPr id="3" name="Picture 2"/>
+          <p:cNvPicPr>
+            <a:picLocks noChangeAspect="1"/>
+          </p:cNvPicPr>
+          <p:nvPr/>
+        </p:nvPicPr>
+        <p:blipFill>
+          <a:blip r:embed="rId2"/>
+          <a:stretch>
+            <a:fillRect/>
+          </a:stretch>
+        </p:blipFill>
+        <p:spPr>
+          <a:xfrm>
+            <a:off x="3627782" y="1765202"/>
+            <a:ext cx="8348870" cy="4456694"/>
+          </a:xfrm>
+          <a:prstGeom prst="rect">
+            <a:avLst/>
+          </a:prstGeom>
+        </p:spPr>
+      </p:pic>
       <p:sp>
         <p:nvSpPr>
-          <p:cNvPr id="5" name="Content Placeholder 4"/>
+          <p:cNvPr id="9" name="Content Placeholder 2"/>
           <p:cNvSpPr>
             <a:spLocks noGrp="1"/>
           </p:cNvSpPr>
@@ -14724,52 +15269,202 @@
             <p:ph idx="1"/>
           </p:nvPr>
         </p:nvSpPr>
-        <p:spPr/>
+        <p:spPr>
+          <a:xfrm>
+            <a:off x="1097280" y="1845734"/>
+            <a:ext cx="3584050" cy="4023360"/>
+          </a:xfrm>
+        </p:spPr>
         <p:txBody>
-          <a:bodyPr/>
+          <a:bodyPr>
+            <a:normAutofit lnSpcReduction="10000"/>
+          </a:bodyPr>
           <a:lstStyle/>
           <a:p>
-            <a:endParaRPr lang="en-US"/>
+            <a:pPr lvl="1"/>
+            <a:r>
+              <a:rPr lang="en-US" dirty="0" smtClean="0"/>
+              <a:t>Access Online Library</a:t>
+            </a:r>
+          </a:p>
+          <a:p>
+            <a:pPr marL="726948" lvl="2" indent="-342900">
+              <a:buFont typeface="+mj-lt"/>
+              <a:buAutoNum type="arabicPeriod"/>
+            </a:pPr>
+            <a:r>
+              <a:rPr lang="en-US" dirty="0" smtClean="0"/>
+              <a:t>Register</a:t>
+            </a:r>
+          </a:p>
+          <a:p>
+            <a:pPr marL="726948" lvl="2" indent="-342900">
+              <a:buFont typeface="+mj-lt"/>
+              <a:buAutoNum type="arabicPeriod"/>
+            </a:pPr>
+            <a:r>
+              <a:rPr lang="en-US" dirty="0" smtClean="0"/>
+              <a:t>Login</a:t>
+            </a:r>
+          </a:p>
+          <a:p>
+            <a:pPr lvl="1"/>
+            <a:r>
+              <a:rPr lang="en-US" dirty="0" smtClean="0"/>
+              <a:t>Add a Book</a:t>
+            </a:r>
+          </a:p>
+          <a:p>
+            <a:pPr lvl="1"/>
+            <a:r>
+              <a:rPr lang="en-US" dirty="0"/>
+              <a:t>Manage Books</a:t>
+            </a:r>
+          </a:p>
+          <a:p>
+            <a:pPr marL="726948" lvl="2" indent="-342900">
+              <a:buFont typeface="+mj-lt"/>
+              <a:buAutoNum type="arabicPeriod"/>
+            </a:pPr>
+            <a:r>
+              <a:rPr lang="en-US" dirty="0"/>
+              <a:t>Search Book</a:t>
+            </a:r>
+          </a:p>
+          <a:p>
+            <a:pPr marL="726948" lvl="2" indent="-342900">
+              <a:buFont typeface="+mj-lt"/>
+              <a:buAutoNum type="arabicPeriod"/>
+            </a:pPr>
+            <a:r>
+              <a:rPr lang="en-US" dirty="0"/>
+              <a:t>Select Book</a:t>
+            </a:r>
+          </a:p>
+          <a:p>
+            <a:pPr marL="909828" lvl="3" indent="-342900">
+              <a:buFont typeface="+mj-lt"/>
+              <a:buAutoNum type="arabicPeriod"/>
+            </a:pPr>
+            <a:r>
+              <a:rPr lang="en-US" dirty="0"/>
+              <a:t>Update Book</a:t>
+            </a:r>
+          </a:p>
+          <a:p>
+            <a:pPr marL="909828" lvl="3" indent="-342900">
+              <a:buFont typeface="+mj-lt"/>
+              <a:buAutoNum type="arabicPeriod"/>
+            </a:pPr>
+            <a:r>
+              <a:rPr lang="en-US" dirty="0"/>
+              <a:t>Delete </a:t>
+            </a:r>
+            <a:r>
+              <a:rPr lang="en-US" dirty="0" smtClean="0"/>
+              <a:t>Book</a:t>
+            </a:r>
+          </a:p>
+          <a:p>
+            <a:pPr lvl="1"/>
+            <a:r>
+              <a:rPr lang="en-US" dirty="0" smtClean="0"/>
+              <a:t>Visit Personal Section</a:t>
+            </a:r>
+          </a:p>
+          <a:p>
+            <a:pPr marL="726948" lvl="2" indent="-342900">
+              <a:buFont typeface="+mj-lt"/>
+              <a:buAutoNum type="arabicPeriod"/>
+            </a:pPr>
+            <a:r>
+              <a:rPr lang="en-US" dirty="0" smtClean="0"/>
+              <a:t>Choose Metadata Tags</a:t>
+            </a:r>
+          </a:p>
+          <a:p>
+            <a:pPr marL="726948" lvl="2" indent="-342900">
+              <a:buFont typeface="+mj-lt"/>
+              <a:buAutoNum type="arabicPeriod"/>
+            </a:pPr>
+            <a:r>
+              <a:rPr lang="en-US" dirty="0" smtClean="0"/>
+              <a:t>View Personal Books</a:t>
+            </a:r>
+          </a:p>
+          <a:p>
+            <a:pPr lvl="1"/>
+            <a:r>
+              <a:rPr lang="en-US" dirty="0" smtClean="0"/>
+              <a:t>Visit Social Section</a:t>
+            </a:r>
+          </a:p>
+          <a:p>
+            <a:pPr marL="726948" lvl="2" indent="-342900">
+              <a:buFont typeface="+mj-lt"/>
+              <a:buAutoNum type="arabicPeriod"/>
+            </a:pPr>
+            <a:r>
+              <a:rPr lang="en-US" dirty="0" smtClean="0"/>
+              <a:t>Choose Topics</a:t>
+            </a:r>
+          </a:p>
+          <a:p>
+            <a:pPr marL="726948" lvl="2" indent="-342900">
+              <a:buFont typeface="+mj-lt"/>
+              <a:buAutoNum type="arabicPeriod"/>
+            </a:pPr>
+            <a:r>
+              <a:rPr lang="en-US" dirty="0" smtClean="0"/>
+              <a:t>View Recommended Books</a:t>
+            </a:r>
+          </a:p>
+          <a:p>
+            <a:pPr lvl="2"/>
+            <a:endParaRPr lang="en-US" dirty="0"/>
+          </a:p>
+          <a:p>
+            <a:pPr marL="384048" lvl="2" indent="0">
+              <a:buNone/>
+            </a:pPr>
+            <a:endParaRPr lang="en-US" dirty="0" smtClean="0"/>
           </a:p>
         </p:txBody>
       </p:sp>
-      <p:pic>
-        <p:nvPicPr>
-          <p:cNvPr id="8" name="Picture 7" descr="E:\Erasmus Journey Data\Maynooth University\Course Material - MU\CS615\CS615 Project\WhatsApp Image 2020-04-04 at 12.25.12 AM (1).jpeg"/>
-          <p:cNvPicPr/>
+      <p:cxnSp>
+        <p:nvCxnSpPr>
+          <p:cNvPr id="10" name="Straight Connector 9"/>
+          <p:cNvCxnSpPr/>
           <p:nvPr/>
-        </p:nvPicPr>
-        <p:blipFill>
-          <a:blip r:embed="rId2">
-            <a:extLst>
-              <a:ext uri="{28A0092B-C50C-407E-A947-70E740481C1C}">
-                <a14:useLocalDpi xmlns:a14="http://schemas.microsoft.com/office/drawing/2010/main" val="0"/>
-              </a:ext>
-            </a:extLst>
-          </a:blip>
-          <a:srcRect/>
-          <a:stretch>
-            <a:fillRect/>
-          </a:stretch>
-        </p:blipFill>
-        <p:spPr bwMode="auto">
+        </p:nvCxnSpPr>
+        <p:spPr>
           <a:xfrm>
-            <a:off x="109330" y="795131"/>
-            <a:ext cx="11996531" cy="5516218"/>
+            <a:off x="1097280" y="1735385"/>
+            <a:ext cx="10204174" cy="0"/>
           </a:xfrm>
-          <a:prstGeom prst="rect">
+          <a:prstGeom prst="line">
             <a:avLst/>
           </a:prstGeom>
-          <a:noFill/>
-          <a:ln>
-            <a:noFill/>
-          </a:ln>
         </p:spPr>
-      </p:pic>
+        <p:style>
+          <a:lnRef idx="1">
+            <a:schemeClr val="accent1"/>
+          </a:lnRef>
+          <a:fillRef idx="0">
+            <a:schemeClr val="accent1"/>
+          </a:fillRef>
+          <a:effectRef idx="0">
+            <a:schemeClr val="accent1"/>
+          </a:effectRef>
+          <a:fontRef idx="minor">
+            <a:schemeClr val="tx1"/>
+          </a:fontRef>
+        </p:style>
+      </p:cxnSp>
     </p:spTree>
     <p:extLst>
       <p:ext uri="{BB962C8B-B14F-4D97-AF65-F5344CB8AC3E}">
-        <p14:creationId xmlns:p14="http://schemas.microsoft.com/office/powerpoint/2010/main" val="1539725459"/>
+        <p14:creationId xmlns:p14="http://schemas.microsoft.com/office/powerpoint/2010/main" val="1581142524"/>
       </p:ext>
     </p:extLst>
   </p:cSld>

</xml_diff>